<commit_message>
commit avec evolution presentation modif redirect apres inscription
</commit_message>
<xml_diff>
--- a/Présentation/Présentation WeBet_JBL.pptx
+++ b/Présentation/Présentation WeBet_JBL.pptx
@@ -13,6 +13,10 @@
     <p:sldId id="261" r:id="rId8"/>
     <p:sldId id="262" r:id="rId9"/>
     <p:sldId id="263" r:id="rId10"/>
+    <p:sldId id="264" r:id="rId11"/>
+    <p:sldId id="266" r:id="rId12"/>
+    <p:sldId id="265" r:id="rId13"/>
+    <p:sldId id="267" r:id="rId14"/>
   </p:sldIdLst>
   <p:sldSz cx="9144000" cy="6858000" type="screen4x3"/>
   <p:notesSz cx="6858000" cy="9144000"/>
@@ -128,6 +132,32 @@
     </p:ext>
   </p:extLst>
 </p:presentation>
+</file>
+
+<file path=ppt/commentAuthors.xml><?xml version="1.0" encoding="utf-8"?>
+<p:cmAuthorLst xmlns:a="http://schemas.openxmlformats.org/drawingml/2006/main" xmlns:r="http://schemas.openxmlformats.org/officeDocument/2006/relationships" xmlns:p="http://schemas.openxmlformats.org/presentationml/2006/main">
+  <p:cmAuthor id="1" name="Formation J2E" initials="FJ" lastIdx="1" clrIdx="0">
+    <p:extLst>
+      <p:ext uri="{19B8F6BF-5375-455C-9EA6-DF929625EA0E}">
+        <p15:presenceInfo xmlns:p15="http://schemas.microsoft.com/office/powerpoint/2012/main" userId="Formation J2E" providerId="None"/>
+      </p:ext>
+    </p:extLst>
+  </p:cmAuthor>
+</p:cmAuthorLst>
+</file>
+
+<file path=ppt/comments/comment1.xml><?xml version="1.0" encoding="utf-8"?>
+<p:cmLst xmlns:a="http://schemas.openxmlformats.org/drawingml/2006/main" xmlns:r="http://schemas.openxmlformats.org/officeDocument/2006/relationships" xmlns:p="http://schemas.openxmlformats.org/presentationml/2006/main">
+  <p:cm authorId="1" dt="2018-07-10T10:45:43.488" idx="1">
+    <p:pos x="5329" y="1117"/>
+    <p:text/>
+    <p:extLst>
+      <p:ext uri="{C676402C-5697-4E1C-873F-D02D1690AC5C}">
+        <p15:threadingInfo xmlns:p15="http://schemas.microsoft.com/office/powerpoint/2012/main" timeZoneBias="-120"/>
+      </p:ext>
+    </p:extLst>
+  </p:cm>
+</p:cmLst>
 </file>
 
 <file path=ppt/slideLayouts/slideLayout1.xml><?xml version="1.0" encoding="utf-8"?>
@@ -7935,7 +7965,7 @@
 </p:sld>
 </file>
 
-<file path=ppt/slides/slide2.xml><?xml version="1.0" encoding="utf-8"?>
+<file path=ppt/slides/slide10.xml><?xml version="1.0" encoding="utf-8"?>
 <p:sld xmlns:a="http://schemas.openxmlformats.org/drawingml/2006/main" xmlns:r="http://schemas.openxmlformats.org/officeDocument/2006/relationships" xmlns:p="http://schemas.openxmlformats.org/presentationml/2006/main">
   <p:cSld>
     <p:spTree>
@@ -7974,1103 +8004,9 @@
           <a:p>
             <a:r>
               <a:rPr lang="fr-FR" dirty="0" smtClean="0"/>
-              <a:t>Conduite de la présentation</a:t>
+              <a:t>Développement</a:t>
             </a:r>
             <a:endParaRPr lang="fr-FR" dirty="0"/>
-          </a:p>
-        </p:txBody>
-      </p:sp>
-      <p:sp>
-        <p:nvSpPr>
-          <p:cNvPr id="3" name="Espace réservé du contenu 2"/>
-          <p:cNvSpPr>
-            <a:spLocks noGrp="1"/>
-          </p:cNvSpPr>
-          <p:nvPr>
-            <p:ph idx="1"/>
-          </p:nvPr>
-        </p:nvSpPr>
-        <p:spPr/>
-        <p:txBody>
-          <a:bodyPr/>
-          <a:lstStyle/>
-          <a:p>
-            <a:r>
-              <a:rPr lang="fr-FR" dirty="0" smtClean="0"/>
-              <a:t>Introduction</a:t>
-            </a:r>
-          </a:p>
-          <a:p>
-            <a:r>
-              <a:rPr lang="fr-FR" dirty="0" smtClean="0"/>
-              <a:t>Analyse du besoin</a:t>
-            </a:r>
-          </a:p>
-          <a:p>
-            <a:r>
-              <a:rPr lang="fr-FR" dirty="0" smtClean="0"/>
-              <a:t>Contraintes</a:t>
-            </a:r>
-          </a:p>
-          <a:p>
-            <a:r>
-              <a:rPr lang="fr-FR" dirty="0" smtClean="0"/>
-              <a:t>Solution technique</a:t>
-            </a:r>
-          </a:p>
-          <a:p>
-            <a:r>
-              <a:rPr lang="fr-FR" dirty="0" smtClean="0"/>
-              <a:t>Conception</a:t>
-            </a:r>
-          </a:p>
-          <a:p>
-            <a:r>
-              <a:rPr lang="fr-FR" dirty="0" smtClean="0"/>
-              <a:t>Développement</a:t>
-            </a:r>
-          </a:p>
-          <a:p>
-            <a:r>
-              <a:rPr lang="fr-FR" dirty="0" smtClean="0"/>
-              <a:t>Tests</a:t>
-            </a:r>
-          </a:p>
-          <a:p>
-            <a:r>
-              <a:rPr lang="fr-FR" dirty="0" smtClean="0"/>
-              <a:t>Conclusion</a:t>
-            </a:r>
-            <a:endParaRPr lang="fr-FR" dirty="0"/>
-          </a:p>
-        </p:txBody>
-      </p:sp>
-    </p:spTree>
-    <p:extLst>
-      <p:ext uri="{BB962C8B-B14F-4D97-AF65-F5344CB8AC3E}">
-        <p14:creationId xmlns:p14="http://schemas.microsoft.com/office/powerpoint/2010/main" val="1835602533"/>
-      </p:ext>
-    </p:extLst>
-  </p:cSld>
-  <p:clrMapOvr>
-    <a:masterClrMapping/>
-  </p:clrMapOvr>
-  <p:timing>
-    <p:tnLst>
-      <p:par>
-        <p:cTn id="1" dur="indefinite" restart="never" nodeType="tmRoot"/>
-      </p:par>
-    </p:tnLst>
-  </p:timing>
-</p:sld>
-</file>
-
-<file path=ppt/slides/slide3.xml><?xml version="1.0" encoding="utf-8"?>
-<p:sld xmlns:a="http://schemas.openxmlformats.org/drawingml/2006/main" xmlns:r="http://schemas.openxmlformats.org/officeDocument/2006/relationships" xmlns:p="http://schemas.openxmlformats.org/presentationml/2006/main">
-  <p:cSld>
-    <p:spTree>
-      <p:nvGrpSpPr>
-        <p:cNvPr id="1" name=""/>
-        <p:cNvGrpSpPr/>
-        <p:nvPr/>
-      </p:nvGrpSpPr>
-      <p:grpSpPr>
-        <a:xfrm>
-          <a:off x="0" y="0"/>
-          <a:ext cx="0" cy="0"/>
-          <a:chOff x="0" y="0"/>
-          <a:chExt cx="0" cy="0"/>
-        </a:xfrm>
-      </p:grpSpPr>
-      <p:sp>
-        <p:nvSpPr>
-          <p:cNvPr id="2" name="Titre 1"/>
-          <p:cNvSpPr>
-            <a:spLocks noGrp="1"/>
-          </p:cNvSpPr>
-          <p:nvPr>
-            <p:ph type="title"/>
-          </p:nvPr>
-        </p:nvSpPr>
-        <p:spPr/>
-        <p:txBody>
-          <a:bodyPr/>
-          <a:lstStyle/>
-          <a:p>
-            <a:r>
-              <a:rPr lang="fr-FR" dirty="0" smtClean="0"/>
-              <a:t>Introduction</a:t>
-            </a:r>
-            <a:endParaRPr lang="fr-FR" dirty="0"/>
-          </a:p>
-        </p:txBody>
-      </p:sp>
-      <p:sp>
-        <p:nvSpPr>
-          <p:cNvPr id="3" name="Espace réservé du contenu 2"/>
-          <p:cNvSpPr>
-            <a:spLocks noGrp="1"/>
-          </p:cNvSpPr>
-          <p:nvPr>
-            <p:ph idx="1"/>
-          </p:nvPr>
-        </p:nvSpPr>
-        <p:spPr/>
-        <p:txBody>
-          <a:bodyPr>
-            <a:normAutofit fontScale="62500" lnSpcReduction="20000"/>
-          </a:bodyPr>
-          <a:lstStyle/>
-          <a:p>
-            <a:r>
-              <a:rPr lang="fr-FR" dirty="0" smtClean="0"/>
-              <a:t>Reconversion professionnelle</a:t>
-            </a:r>
-          </a:p>
-          <a:p>
-            <a:r>
-              <a:rPr lang="fr-FR" dirty="0" smtClean="0"/>
-              <a:t>Aboutissement d’une formation de 3,5 mois en informatique traitant de:</a:t>
-            </a:r>
-          </a:p>
-          <a:p>
-            <a:pPr lvl="1"/>
-            <a:r>
-              <a:rPr lang="fr-FR" dirty="0" smtClean="0"/>
-              <a:t>Conduite de projet méthode Agile SCRUM</a:t>
-            </a:r>
-          </a:p>
-          <a:p>
-            <a:pPr lvl="1"/>
-            <a:r>
-              <a:rPr lang="fr-FR" dirty="0"/>
-              <a:t>Apprentissage du langage </a:t>
-            </a:r>
-            <a:r>
-              <a:rPr lang="fr-FR" dirty="0" smtClean="0"/>
-              <a:t>UML</a:t>
-            </a:r>
-          </a:p>
-          <a:p>
-            <a:pPr lvl="1"/>
-            <a:r>
-              <a:rPr lang="fr-FR" dirty="0" smtClean="0"/>
-              <a:t>Apprentissage du langage Java</a:t>
-            </a:r>
-          </a:p>
-          <a:p>
-            <a:pPr lvl="1"/>
-            <a:r>
-              <a:rPr lang="fr-FR" dirty="0"/>
-              <a:t>Apprentissage du code HTML</a:t>
-            </a:r>
-          </a:p>
-          <a:p>
-            <a:pPr lvl="1"/>
-            <a:r>
-              <a:rPr lang="fr-FR" dirty="0" smtClean="0"/>
-              <a:t>Apprentissage </a:t>
-            </a:r>
-            <a:r>
-              <a:rPr lang="fr-FR" dirty="0"/>
-              <a:t>des </a:t>
-            </a:r>
-            <a:r>
-              <a:rPr lang="fr-FR" dirty="0" err="1"/>
-              <a:t>frameworks</a:t>
-            </a:r>
-            <a:r>
-              <a:rPr lang="fr-FR" dirty="0"/>
-              <a:t> </a:t>
-            </a:r>
-            <a:r>
-              <a:rPr lang="fr-FR" dirty="0" err="1"/>
-              <a:t>Spring</a:t>
-            </a:r>
-            <a:endParaRPr lang="fr-FR" dirty="0"/>
-          </a:p>
-          <a:p>
-            <a:pPr lvl="2"/>
-            <a:r>
-              <a:rPr lang="fr-FR" dirty="0" smtClean="0"/>
-              <a:t>Gestion des dépendances avec MAVEN</a:t>
-            </a:r>
-          </a:p>
-          <a:p>
-            <a:pPr lvl="2"/>
-            <a:r>
-              <a:rPr lang="fr-FR" dirty="0" smtClean="0"/>
-              <a:t>Gestion de base de donnée en langage SQL</a:t>
-            </a:r>
-          </a:p>
-          <a:p>
-            <a:pPr lvl="2"/>
-            <a:r>
-              <a:rPr lang="fr-FR" dirty="0" err="1" smtClean="0"/>
-              <a:t>Mapping</a:t>
-            </a:r>
-            <a:r>
-              <a:rPr lang="fr-FR" dirty="0" smtClean="0"/>
-              <a:t> des </a:t>
-            </a:r>
-            <a:r>
-              <a:rPr lang="fr-FR" dirty="0"/>
-              <a:t>bases de </a:t>
-            </a:r>
-            <a:r>
-              <a:rPr lang="fr-FR" dirty="0" smtClean="0"/>
-              <a:t>données relationnelles</a:t>
-            </a:r>
-            <a:endParaRPr lang="fr-FR" dirty="0"/>
-          </a:p>
-          <a:p>
-            <a:pPr lvl="2"/>
-            <a:r>
-              <a:rPr lang="fr-FR" dirty="0"/>
-              <a:t>MVC </a:t>
-            </a:r>
-            <a:endParaRPr lang="fr-FR" dirty="0" smtClean="0"/>
-          </a:p>
-          <a:p>
-            <a:pPr lvl="2"/>
-            <a:r>
-              <a:rPr lang="fr-FR" dirty="0" smtClean="0"/>
-              <a:t>Sécurité</a:t>
-            </a:r>
-          </a:p>
-          <a:p>
-            <a:pPr lvl="2"/>
-            <a:r>
-              <a:rPr lang="fr-FR" dirty="0"/>
-              <a:t>Développement collaboratif avec </a:t>
-            </a:r>
-            <a:r>
-              <a:rPr lang="fr-FR" dirty="0" smtClean="0"/>
-              <a:t>Git et GitHub</a:t>
-            </a:r>
-          </a:p>
-          <a:p>
-            <a:r>
-              <a:rPr lang="fr-FR" dirty="0" smtClean="0"/>
-              <a:t>Projet final mettant en œuvre les acquis de la formation basé sur un cahier des charges.</a:t>
-            </a:r>
-            <a:endParaRPr lang="fr-FR" dirty="0"/>
-          </a:p>
-          <a:p>
-            <a:pPr lvl="2"/>
-            <a:endParaRPr lang="fr-FR" dirty="0" smtClean="0"/>
-          </a:p>
-          <a:p>
-            <a:pPr lvl="2"/>
-            <a:endParaRPr lang="fr-FR" dirty="0"/>
-          </a:p>
-          <a:p>
-            <a:pPr lvl="2"/>
-            <a:endParaRPr lang="fr-FR" dirty="0" smtClean="0"/>
-          </a:p>
-          <a:p>
-            <a:pPr lvl="1"/>
-            <a:endParaRPr lang="fr-FR" dirty="0"/>
-          </a:p>
-        </p:txBody>
-      </p:sp>
-    </p:spTree>
-    <p:extLst>
-      <p:ext uri="{BB962C8B-B14F-4D97-AF65-F5344CB8AC3E}">
-        <p14:creationId xmlns:p14="http://schemas.microsoft.com/office/powerpoint/2010/main" val="1738298774"/>
-      </p:ext>
-    </p:extLst>
-  </p:cSld>
-  <p:clrMapOvr>
-    <a:masterClrMapping/>
-  </p:clrMapOvr>
-  <p:timing>
-    <p:tnLst>
-      <p:par>
-        <p:cTn id="1" dur="indefinite" restart="never" nodeType="tmRoot"/>
-      </p:par>
-    </p:tnLst>
-  </p:timing>
-</p:sld>
-</file>
-
-<file path=ppt/slides/slide4.xml><?xml version="1.0" encoding="utf-8"?>
-<p:sld xmlns:a="http://schemas.openxmlformats.org/drawingml/2006/main" xmlns:r="http://schemas.openxmlformats.org/officeDocument/2006/relationships" xmlns:p="http://schemas.openxmlformats.org/presentationml/2006/main">
-  <p:cSld>
-    <p:spTree>
-      <p:nvGrpSpPr>
-        <p:cNvPr id="1" name=""/>
-        <p:cNvGrpSpPr/>
-        <p:nvPr/>
-      </p:nvGrpSpPr>
-      <p:grpSpPr>
-        <a:xfrm>
-          <a:off x="0" y="0"/>
-          <a:ext cx="0" cy="0"/>
-          <a:chOff x="0" y="0"/>
-          <a:chExt cx="0" cy="0"/>
-        </a:xfrm>
-      </p:grpSpPr>
-      <p:pic>
-        <p:nvPicPr>
-          <p:cNvPr id="4" name="Image 3"/>
-          <p:cNvPicPr>
-            <a:picLocks noChangeAspect="1"/>
-          </p:cNvPicPr>
-          <p:nvPr/>
-        </p:nvPicPr>
-        <p:blipFill>
-          <a:blip r:embed="rId2" cstate="print">
-            <a:extLst>
-              <a:ext uri="{28A0092B-C50C-407E-A947-70E740481C1C}">
-                <a14:useLocalDpi xmlns:a14="http://schemas.microsoft.com/office/drawing/2010/main" val="0"/>
-              </a:ext>
-            </a:extLst>
-          </a:blip>
-          <a:stretch>
-            <a:fillRect/>
-          </a:stretch>
-        </p:blipFill>
-        <p:spPr>
-          <a:xfrm>
-            <a:off x="5580112" y="1556792"/>
-            <a:ext cx="2376264" cy="3636299"/>
-          </a:xfrm>
-          <a:prstGeom prst="rect">
-            <a:avLst/>
-          </a:prstGeom>
-          <a:ln>
-            <a:noFill/>
-          </a:ln>
-          <a:effectLst>
-            <a:softEdge rad="112500"/>
-          </a:effectLst>
-        </p:spPr>
-      </p:pic>
-      <p:sp>
-        <p:nvSpPr>
-          <p:cNvPr id="2" name="Titre 1"/>
-          <p:cNvSpPr>
-            <a:spLocks noGrp="1"/>
-          </p:cNvSpPr>
-          <p:nvPr>
-            <p:ph type="title"/>
-          </p:nvPr>
-        </p:nvSpPr>
-        <p:spPr>
-          <a:xfrm>
-            <a:off x="1945201" y="624110"/>
-            <a:ext cx="6589199" cy="644650"/>
-          </a:xfrm>
-        </p:spPr>
-        <p:txBody>
-          <a:bodyPr/>
-          <a:lstStyle/>
-          <a:p>
-            <a:r>
-              <a:rPr lang="fr-FR" dirty="0" smtClean="0"/>
-              <a:t>Analyse du besoin</a:t>
-            </a:r>
-            <a:endParaRPr lang="fr-FR" dirty="0"/>
-          </a:p>
-        </p:txBody>
-      </p:sp>
-      <p:sp>
-        <p:nvSpPr>
-          <p:cNvPr id="3" name="Espace réservé du contenu 2"/>
-          <p:cNvSpPr>
-            <a:spLocks noGrp="1"/>
-          </p:cNvSpPr>
-          <p:nvPr>
-            <p:ph idx="1"/>
-          </p:nvPr>
-        </p:nvSpPr>
-        <p:spPr>
-          <a:xfrm>
-            <a:off x="1945201" y="2852936"/>
-            <a:ext cx="6591985" cy="1439416"/>
-          </a:xfrm>
-        </p:spPr>
-        <p:txBody>
-          <a:bodyPr/>
-          <a:lstStyle/>
-          <a:p>
-            <a:r>
-              <a:rPr lang="fr-FR" dirty="0" smtClean="0"/>
-              <a:t>Capture du besoin</a:t>
-            </a:r>
-          </a:p>
-          <a:p>
-            <a:r>
-              <a:rPr lang="fr-FR" dirty="0" smtClean="0"/>
-              <a:t>Analyse du domaine</a:t>
-            </a:r>
-          </a:p>
-          <a:p>
-            <a:r>
-              <a:rPr lang="fr-FR" dirty="0" smtClean="0"/>
-              <a:t>Analyse du domaine objet</a:t>
-            </a:r>
-          </a:p>
-          <a:p>
-            <a:endParaRPr lang="fr-FR" dirty="0"/>
-          </a:p>
-        </p:txBody>
-      </p:sp>
-    </p:spTree>
-    <p:extLst>
-      <p:ext uri="{BB962C8B-B14F-4D97-AF65-F5344CB8AC3E}">
-        <p14:creationId xmlns:p14="http://schemas.microsoft.com/office/powerpoint/2010/main" val="2626397477"/>
-      </p:ext>
-    </p:extLst>
-  </p:cSld>
-  <p:clrMapOvr>
-    <a:masterClrMapping/>
-  </p:clrMapOvr>
-  <p:timing>
-    <p:tnLst>
-      <p:par>
-        <p:cTn id="1" dur="indefinite" restart="never" nodeType="tmRoot"/>
-      </p:par>
-    </p:tnLst>
-  </p:timing>
-</p:sld>
-</file>
-
-<file path=ppt/slides/slide5.xml><?xml version="1.0" encoding="utf-8"?>
-<p:sld xmlns:a="http://schemas.openxmlformats.org/drawingml/2006/main" xmlns:r="http://schemas.openxmlformats.org/officeDocument/2006/relationships" xmlns:p="http://schemas.openxmlformats.org/presentationml/2006/main">
-  <p:cSld>
-    <p:spTree>
-      <p:nvGrpSpPr>
-        <p:cNvPr id="1" name=""/>
-        <p:cNvGrpSpPr/>
-        <p:nvPr/>
-      </p:nvGrpSpPr>
-      <p:grpSpPr>
-        <a:xfrm>
-          <a:off x="0" y="0"/>
-          <a:ext cx="0" cy="0"/>
-          <a:chOff x="0" y="0"/>
-          <a:chExt cx="0" cy="0"/>
-        </a:xfrm>
-      </p:grpSpPr>
-      <p:pic>
-        <p:nvPicPr>
-          <p:cNvPr id="4" name="Image 3"/>
-          <p:cNvPicPr>
-            <a:picLocks noChangeAspect="1"/>
-          </p:cNvPicPr>
-          <p:nvPr/>
-        </p:nvPicPr>
-        <p:blipFill rotWithShape="1">
-          <a:blip r:embed="rId2" cstate="print">
-            <a:extLst>
-              <a:ext uri="{BEBA8EAE-BF5A-486C-A8C5-ECC9F3942E4B}">
-                <a14:imgProps xmlns:a14="http://schemas.microsoft.com/office/drawing/2010/main">
-                  <a14:imgLayer r:embed="rId3">
-                    <a14:imgEffect>
-                      <a14:brightnessContrast bright="20000" contrast="40000"/>
-                    </a14:imgEffect>
-                  </a14:imgLayer>
-                </a14:imgProps>
-              </a:ext>
-              <a:ext uri="{28A0092B-C50C-407E-A947-70E740481C1C}">
-                <a14:useLocalDpi xmlns:a14="http://schemas.microsoft.com/office/drawing/2010/main" val="0"/>
-              </a:ext>
-            </a:extLst>
-          </a:blip>
-          <a:srcRect l="14563" t="19291" r="9051" b="12312"/>
-          <a:stretch/>
-        </p:blipFill>
-        <p:spPr>
-          <a:xfrm>
-            <a:off x="5793933" y="1268760"/>
-            <a:ext cx="3278567" cy="1656184"/>
-          </a:xfrm>
-          <a:prstGeom prst="rect">
-            <a:avLst/>
-          </a:prstGeom>
-          <a:ln>
-            <a:noFill/>
-          </a:ln>
-          <a:effectLst>
-            <a:outerShdw blurRad="190500" algn="tl" rotWithShape="0">
-              <a:srgbClr val="000000">
-                <a:alpha val="70000"/>
-              </a:srgbClr>
-            </a:outerShdw>
-          </a:effectLst>
-        </p:spPr>
-      </p:pic>
-      <p:sp>
-        <p:nvSpPr>
-          <p:cNvPr id="2" name="Titre 1"/>
-          <p:cNvSpPr>
-            <a:spLocks noGrp="1"/>
-          </p:cNvSpPr>
-          <p:nvPr>
-            <p:ph type="title"/>
-          </p:nvPr>
-        </p:nvSpPr>
-        <p:spPr>
-          <a:xfrm>
-            <a:off x="1945201" y="624110"/>
-            <a:ext cx="6589199" cy="644650"/>
-          </a:xfrm>
-        </p:spPr>
-        <p:txBody>
-          <a:bodyPr/>
-          <a:lstStyle/>
-          <a:p>
-            <a:r>
-              <a:rPr lang="fr-FR" dirty="0" smtClean="0"/>
-              <a:t>Analyse du besoin</a:t>
-            </a:r>
-            <a:endParaRPr lang="fr-FR" dirty="0"/>
-          </a:p>
-        </p:txBody>
-      </p:sp>
-      <p:sp>
-        <p:nvSpPr>
-          <p:cNvPr id="3" name="Espace réservé du contenu 2"/>
-          <p:cNvSpPr>
-            <a:spLocks noGrp="1"/>
-          </p:cNvSpPr>
-          <p:nvPr>
-            <p:ph idx="1"/>
-          </p:nvPr>
-        </p:nvSpPr>
-        <p:spPr>
-          <a:xfrm>
-            <a:off x="1942415" y="1379570"/>
-            <a:ext cx="6591985" cy="3777622"/>
-          </a:xfrm>
-        </p:spPr>
-        <p:txBody>
-          <a:bodyPr/>
-          <a:lstStyle/>
-          <a:p>
-            <a:r>
-              <a:rPr lang="fr-FR" dirty="0" smtClean="0"/>
-              <a:t>Capture du besoin</a:t>
-            </a:r>
-          </a:p>
-          <a:p>
-            <a:pPr lvl="1"/>
-            <a:r>
-              <a:rPr lang="fr-FR" dirty="0" smtClean="0"/>
-              <a:t>Définition des Use Cases</a:t>
-            </a:r>
-          </a:p>
-          <a:p>
-            <a:pPr lvl="1"/>
-            <a:r>
-              <a:rPr lang="fr-FR" dirty="0" smtClean="0"/>
-              <a:t>Réalisation du Use Case </a:t>
-            </a:r>
-            <a:r>
-              <a:rPr lang="fr-FR" dirty="0" err="1" smtClean="0"/>
-              <a:t>Diagram</a:t>
-            </a:r>
-            <a:endParaRPr lang="fr-FR" dirty="0" smtClean="0"/>
-          </a:p>
-        </p:txBody>
-      </p:sp>
-      <p:pic>
-        <p:nvPicPr>
-          <p:cNvPr id="5" name="Image 4"/>
-          <p:cNvPicPr>
-            <a:picLocks noChangeAspect="1"/>
-          </p:cNvPicPr>
-          <p:nvPr/>
-        </p:nvPicPr>
-        <p:blipFill>
-          <a:blip r:embed="rId4">
-            <a:extLst>
-              <a:ext uri="{28A0092B-C50C-407E-A947-70E740481C1C}">
-                <a14:useLocalDpi xmlns:a14="http://schemas.microsoft.com/office/drawing/2010/main" val="0"/>
-              </a:ext>
-            </a:extLst>
-          </a:blip>
-          <a:stretch>
-            <a:fillRect/>
-          </a:stretch>
-        </p:blipFill>
-        <p:spPr>
-          <a:xfrm>
-            <a:off x="1475656" y="2492896"/>
-            <a:ext cx="4752528" cy="4233815"/>
-          </a:xfrm>
-          <a:prstGeom prst="rect">
-            <a:avLst/>
-          </a:prstGeom>
-          <a:ln>
-            <a:noFill/>
-          </a:ln>
-          <a:effectLst>
-            <a:outerShdw blurRad="190500" algn="tl" rotWithShape="0">
-              <a:srgbClr val="000000">
-                <a:alpha val="70000"/>
-              </a:srgbClr>
-            </a:outerShdw>
-          </a:effectLst>
-        </p:spPr>
-      </p:pic>
-    </p:spTree>
-    <p:extLst>
-      <p:ext uri="{BB962C8B-B14F-4D97-AF65-F5344CB8AC3E}">
-        <p14:creationId xmlns:p14="http://schemas.microsoft.com/office/powerpoint/2010/main" val="545282299"/>
-      </p:ext>
-    </p:extLst>
-  </p:cSld>
-  <p:clrMapOvr>
-    <a:masterClrMapping/>
-  </p:clrMapOvr>
-  <p:timing>
-    <p:tnLst>
-      <p:par>
-        <p:cTn id="1" dur="indefinite" restart="never" nodeType="tmRoot"/>
-      </p:par>
-    </p:tnLst>
-  </p:timing>
-</p:sld>
-</file>
-
-<file path=ppt/slides/slide6.xml><?xml version="1.0" encoding="utf-8"?>
-<p:sld xmlns:a="http://schemas.openxmlformats.org/drawingml/2006/main" xmlns:r="http://schemas.openxmlformats.org/officeDocument/2006/relationships" xmlns:p="http://schemas.openxmlformats.org/presentationml/2006/main">
-  <p:cSld>
-    <p:spTree>
-      <p:nvGrpSpPr>
-        <p:cNvPr id="1" name=""/>
-        <p:cNvGrpSpPr/>
-        <p:nvPr/>
-      </p:nvGrpSpPr>
-      <p:grpSpPr>
-        <a:xfrm>
-          <a:off x="0" y="0"/>
-          <a:ext cx="0" cy="0"/>
-          <a:chOff x="0" y="0"/>
-          <a:chExt cx="0" cy="0"/>
-        </a:xfrm>
-      </p:grpSpPr>
-      <p:sp>
-        <p:nvSpPr>
-          <p:cNvPr id="2" name="Titre 1"/>
-          <p:cNvSpPr>
-            <a:spLocks noGrp="1"/>
-          </p:cNvSpPr>
-          <p:nvPr>
-            <p:ph type="title"/>
-          </p:nvPr>
-        </p:nvSpPr>
-        <p:spPr>
-          <a:xfrm>
-            <a:off x="1945201" y="624110"/>
-            <a:ext cx="6589199" cy="644650"/>
-          </a:xfrm>
-        </p:spPr>
-        <p:txBody>
-          <a:bodyPr/>
-          <a:lstStyle/>
-          <a:p>
-            <a:r>
-              <a:rPr lang="fr-FR" dirty="0" smtClean="0"/>
-              <a:t>Analyse du besoin</a:t>
-            </a:r>
-            <a:endParaRPr lang="fr-FR" dirty="0"/>
-          </a:p>
-        </p:txBody>
-      </p:sp>
-      <p:sp>
-        <p:nvSpPr>
-          <p:cNvPr id="6" name="Espace réservé du contenu 2"/>
-          <p:cNvSpPr>
-            <a:spLocks noGrp="1"/>
-          </p:cNvSpPr>
-          <p:nvPr>
-            <p:ph idx="1"/>
-          </p:nvPr>
-        </p:nvSpPr>
-        <p:spPr>
-          <a:xfrm>
-            <a:off x="1942415" y="1379570"/>
-            <a:ext cx="6591985" cy="3777622"/>
-          </a:xfrm>
-        </p:spPr>
-        <p:txBody>
-          <a:bodyPr/>
-          <a:lstStyle/>
-          <a:p>
-            <a:r>
-              <a:rPr lang="fr-FR" dirty="0" smtClean="0"/>
-              <a:t>Analyse du domaine Objet</a:t>
-            </a:r>
-          </a:p>
-        </p:txBody>
-      </p:sp>
-      <p:pic>
-        <p:nvPicPr>
-          <p:cNvPr id="8" name="Image 7"/>
-          <p:cNvPicPr>
-            <a:picLocks noChangeAspect="1"/>
-          </p:cNvPicPr>
-          <p:nvPr/>
-        </p:nvPicPr>
-        <p:blipFill>
-          <a:blip r:embed="rId2">
-            <a:extLst>
-              <a:ext uri="{28A0092B-C50C-407E-A947-70E740481C1C}">
-                <a14:useLocalDpi xmlns:a14="http://schemas.microsoft.com/office/drawing/2010/main" val="0"/>
-              </a:ext>
-            </a:extLst>
-          </a:blip>
-          <a:stretch>
-            <a:fillRect/>
-          </a:stretch>
-        </p:blipFill>
-        <p:spPr>
-          <a:xfrm>
-            <a:off x="1942415" y="1772816"/>
-            <a:ext cx="5830804" cy="4766357"/>
-          </a:xfrm>
-          <a:prstGeom prst="rect">
-            <a:avLst/>
-          </a:prstGeom>
-          <a:ln>
-            <a:noFill/>
-          </a:ln>
-          <a:effectLst>
-            <a:outerShdw blurRad="190500" algn="tl" rotWithShape="0">
-              <a:srgbClr val="000000">
-                <a:alpha val="70000"/>
-              </a:srgbClr>
-            </a:outerShdw>
-          </a:effectLst>
-        </p:spPr>
-      </p:pic>
-    </p:spTree>
-    <p:extLst>
-      <p:ext uri="{BB962C8B-B14F-4D97-AF65-F5344CB8AC3E}">
-        <p14:creationId xmlns:p14="http://schemas.microsoft.com/office/powerpoint/2010/main" val="2580400785"/>
-      </p:ext>
-    </p:extLst>
-  </p:cSld>
-  <p:clrMapOvr>
-    <a:masterClrMapping/>
-  </p:clrMapOvr>
-  <p:timing>
-    <p:tnLst>
-      <p:par>
-        <p:cTn id="1" dur="indefinite" restart="never" nodeType="tmRoot"/>
-      </p:par>
-    </p:tnLst>
-  </p:timing>
-</p:sld>
-</file>
-
-<file path=ppt/slides/slide7.xml><?xml version="1.0" encoding="utf-8"?>
-<p:sld xmlns:a="http://schemas.openxmlformats.org/drawingml/2006/main" xmlns:r="http://schemas.openxmlformats.org/officeDocument/2006/relationships" xmlns:p="http://schemas.openxmlformats.org/presentationml/2006/main">
-  <p:cSld>
-    <p:spTree>
-      <p:nvGrpSpPr>
-        <p:cNvPr id="1" name=""/>
-        <p:cNvGrpSpPr/>
-        <p:nvPr/>
-      </p:nvGrpSpPr>
-      <p:grpSpPr>
-        <a:xfrm>
-          <a:off x="0" y="0"/>
-          <a:ext cx="0" cy="0"/>
-          <a:chOff x="0" y="0"/>
-          <a:chExt cx="0" cy="0"/>
-        </a:xfrm>
-      </p:grpSpPr>
-      <p:sp>
-        <p:nvSpPr>
-          <p:cNvPr id="2" name="Titre 1"/>
-          <p:cNvSpPr>
-            <a:spLocks noGrp="1"/>
-          </p:cNvSpPr>
-          <p:nvPr>
-            <p:ph type="title"/>
-          </p:nvPr>
-        </p:nvSpPr>
-        <p:spPr>
-          <a:xfrm>
-            <a:off x="1945201" y="624110"/>
-            <a:ext cx="6589199" cy="788666"/>
-          </a:xfrm>
-        </p:spPr>
-        <p:txBody>
-          <a:bodyPr>
-            <a:normAutofit/>
-          </a:bodyPr>
-          <a:lstStyle/>
-          <a:p>
-            <a:r>
-              <a:rPr lang="fr-FR" dirty="0" smtClean="0"/>
-              <a:t>Contraintes</a:t>
-            </a:r>
-            <a:endParaRPr lang="fr-FR" dirty="0"/>
-          </a:p>
-        </p:txBody>
-      </p:sp>
-      <p:sp>
-        <p:nvSpPr>
-          <p:cNvPr id="3" name="Espace réservé du contenu 2"/>
-          <p:cNvSpPr>
-            <a:spLocks noGrp="1"/>
-          </p:cNvSpPr>
-          <p:nvPr>
-            <p:ph idx="1"/>
-          </p:nvPr>
-        </p:nvSpPr>
-        <p:spPr/>
-        <p:txBody>
-          <a:bodyPr>
-            <a:normAutofit/>
-          </a:bodyPr>
-          <a:lstStyle/>
-          <a:p>
-            <a:r>
-              <a:rPr lang="fr-FR" dirty="0" smtClean="0"/>
-              <a:t>Contraintes</a:t>
-            </a:r>
-          </a:p>
-          <a:p>
-            <a:pPr lvl="1"/>
-            <a:r>
-              <a:rPr lang="fr-FR" dirty="0" smtClean="0"/>
-              <a:t>Temps </a:t>
-            </a:r>
-          </a:p>
-          <a:p>
-            <a:pPr lvl="2"/>
-            <a:r>
-              <a:rPr lang="fr-FR" dirty="0" smtClean="0"/>
-              <a:t>Durée pour faire le cycle complet du projet: 5 jours</a:t>
-            </a:r>
-          </a:p>
-          <a:p>
-            <a:pPr lvl="1"/>
-            <a:endParaRPr lang="fr-FR" dirty="0" smtClean="0"/>
-          </a:p>
-          <a:p>
-            <a:pPr lvl="1"/>
-            <a:r>
-              <a:rPr lang="fr-FR" dirty="0" smtClean="0"/>
-              <a:t>Techniques :</a:t>
-            </a:r>
-          </a:p>
-          <a:p>
-            <a:pPr lvl="2"/>
-            <a:r>
-              <a:rPr lang="fr-FR" dirty="0" smtClean="0"/>
-              <a:t>Projet destiné à la Java Virtual Machine</a:t>
-            </a:r>
-          </a:p>
-          <a:p>
-            <a:pPr marL="914400" lvl="2" indent="0">
-              <a:buNone/>
-            </a:pPr>
-            <a:endParaRPr lang="fr-FR" dirty="0" smtClean="0"/>
-          </a:p>
-          <a:p>
-            <a:pPr lvl="1"/>
-            <a:r>
-              <a:rPr lang="fr-FR" dirty="0" smtClean="0"/>
-              <a:t>Financières: </a:t>
-            </a:r>
-          </a:p>
-          <a:p>
-            <a:pPr lvl="2"/>
-            <a:r>
-              <a:rPr lang="fr-FR" dirty="0" smtClean="0"/>
-              <a:t>Projet non financé</a:t>
-            </a:r>
-            <a:endParaRPr lang="fr-FR" dirty="0"/>
-          </a:p>
-        </p:txBody>
-      </p:sp>
-    </p:spTree>
-    <p:extLst>
-      <p:ext uri="{BB962C8B-B14F-4D97-AF65-F5344CB8AC3E}">
-        <p14:creationId xmlns:p14="http://schemas.microsoft.com/office/powerpoint/2010/main" val="3776268605"/>
-      </p:ext>
-    </p:extLst>
-  </p:cSld>
-  <p:clrMapOvr>
-    <a:masterClrMapping/>
-  </p:clrMapOvr>
-  <p:timing>
-    <p:tnLst>
-      <p:par>
-        <p:cTn id="1" dur="indefinite" restart="never" nodeType="tmRoot"/>
-      </p:par>
-    </p:tnLst>
-  </p:timing>
-</p:sld>
-</file>
-
-<file path=ppt/slides/slide8.xml><?xml version="1.0" encoding="utf-8"?>
-<p:sld xmlns:a="http://schemas.openxmlformats.org/drawingml/2006/main" xmlns:r="http://schemas.openxmlformats.org/officeDocument/2006/relationships" xmlns:p="http://schemas.openxmlformats.org/presentationml/2006/main">
-  <p:cSld>
-    <p:spTree>
-      <p:nvGrpSpPr>
-        <p:cNvPr id="1" name=""/>
-        <p:cNvGrpSpPr/>
-        <p:nvPr/>
-      </p:nvGrpSpPr>
-      <p:grpSpPr>
-        <a:xfrm>
-          <a:off x="0" y="0"/>
-          <a:ext cx="0" cy="0"/>
-          <a:chOff x="0" y="0"/>
-          <a:chExt cx="0" cy="0"/>
-        </a:xfrm>
-      </p:grpSpPr>
-      <p:sp>
-        <p:nvSpPr>
-          <p:cNvPr id="2" name="Titre 1"/>
-          <p:cNvSpPr>
-            <a:spLocks noGrp="1"/>
-          </p:cNvSpPr>
-          <p:nvPr>
-            <p:ph type="title"/>
-          </p:nvPr>
-        </p:nvSpPr>
-        <p:spPr>
-          <a:xfrm>
-            <a:off x="1945201" y="624110"/>
-            <a:ext cx="6589199" cy="788666"/>
-          </a:xfrm>
-        </p:spPr>
-        <p:txBody>
-          <a:bodyPr/>
-          <a:lstStyle/>
-          <a:p>
-            <a:r>
-              <a:rPr lang="fr-FR" dirty="0"/>
-              <a:t>Solution technique</a:t>
-            </a:r>
-          </a:p>
-        </p:txBody>
-      </p:sp>
-      <p:sp>
-        <p:nvSpPr>
-          <p:cNvPr id="4" name="Espace réservé du contenu 2"/>
-          <p:cNvSpPr>
-            <a:spLocks noGrp="1"/>
-          </p:cNvSpPr>
-          <p:nvPr>
-            <p:ph idx="1"/>
-          </p:nvPr>
-        </p:nvSpPr>
-        <p:spPr>
-          <a:xfrm>
-            <a:off x="2552015" y="2034888"/>
-            <a:ext cx="6591985" cy="2159496"/>
-          </a:xfrm>
-        </p:spPr>
-        <p:txBody>
-          <a:bodyPr>
-            <a:normAutofit/>
-          </a:bodyPr>
-          <a:lstStyle/>
-          <a:p>
-            <a:r>
-              <a:rPr lang="fr-FR" dirty="0" smtClean="0"/>
-              <a:t>UML </a:t>
-            </a:r>
-            <a:r>
-              <a:rPr lang="fr-FR" dirty="0"/>
-              <a:t>avec </a:t>
-            </a:r>
-            <a:r>
-              <a:rPr lang="fr-FR" dirty="0" err="1" smtClean="0"/>
-              <a:t>Astah</a:t>
-            </a:r>
-            <a:endParaRPr lang="fr-FR" dirty="0" smtClean="0"/>
-          </a:p>
-          <a:p>
-            <a:r>
-              <a:rPr lang="fr-FR" dirty="0" smtClean="0"/>
-              <a:t>IDE Eclipse </a:t>
-            </a:r>
-            <a:r>
-              <a:rPr lang="fr-FR" dirty="0" err="1" smtClean="0"/>
-              <a:t>Oxygen</a:t>
-            </a:r>
-            <a:endParaRPr lang="fr-FR" dirty="0" smtClean="0"/>
-          </a:p>
-          <a:p>
-            <a:r>
-              <a:rPr lang="fr-FR" dirty="0"/>
-              <a:t>Serveur local </a:t>
-            </a:r>
-            <a:r>
-              <a:rPr lang="fr-FR" dirty="0" err="1"/>
-              <a:t>Tomcat</a:t>
-            </a:r>
-            <a:r>
-              <a:rPr lang="fr-FR" dirty="0"/>
-              <a:t> 8.5</a:t>
-            </a:r>
-          </a:p>
-          <a:p>
-            <a:r>
-              <a:rPr lang="fr-FR" dirty="0" err="1" smtClean="0"/>
-              <a:t>Git’s</a:t>
-            </a:r>
-            <a:r>
-              <a:rPr lang="fr-FR" dirty="0" smtClean="0"/>
-              <a:t> </a:t>
-            </a:r>
-            <a:r>
-              <a:rPr lang="fr-FR" dirty="0" err="1"/>
-              <a:t>remote</a:t>
-            </a:r>
-            <a:r>
-              <a:rPr lang="fr-FR" dirty="0"/>
-              <a:t> </a:t>
-            </a:r>
-            <a:r>
-              <a:rPr lang="fr-FR" dirty="0" err="1"/>
-              <a:t>repository</a:t>
-            </a:r>
-            <a:r>
-              <a:rPr lang="fr-FR" dirty="0"/>
-              <a:t> avec GitHub</a:t>
-            </a:r>
-          </a:p>
-          <a:p>
-            <a:r>
-              <a:rPr lang="fr-FR" dirty="0" err="1" smtClean="0"/>
-              <a:t>Backlog</a:t>
-            </a:r>
-            <a:r>
-              <a:rPr lang="fr-FR" dirty="0" smtClean="0"/>
-              <a:t> </a:t>
-            </a:r>
-            <a:r>
-              <a:rPr lang="fr-FR" dirty="0"/>
-              <a:t>à </a:t>
-            </a:r>
-            <a:r>
-              <a:rPr lang="fr-FR" dirty="0" smtClean="0"/>
-              <a:t>post-it au lieu d’utiliser </a:t>
-            </a:r>
-            <a:r>
-              <a:rPr lang="fr-FR" dirty="0" err="1" smtClean="0"/>
-              <a:t>Jira</a:t>
-            </a:r>
-            <a:endParaRPr lang="fr-FR" dirty="0" smtClean="0"/>
-          </a:p>
-          <a:p>
-            <a:pPr marL="914400" lvl="2" indent="0">
-              <a:buNone/>
-            </a:pPr>
-            <a:endParaRPr lang="fr-FR" dirty="0" smtClean="0"/>
           </a:p>
         </p:txBody>
       </p:sp>
@@ -9085,7 +8021,7 @@
         <p:spPr>
           <a:xfrm>
             <a:off x="1940455" y="1484784"/>
-            <a:ext cx="6591985" cy="504056"/>
+            <a:ext cx="6591985" cy="4968552"/>
           </a:xfrm>
           <a:prstGeom prst="rect">
             <a:avLst/>
@@ -9316,15 +8252,3135 @@
           <a:p>
             <a:r>
               <a:rPr lang="fr-FR" dirty="0" smtClean="0"/>
-              <a:t>Conception et développement d’une application « légère » </a:t>
-            </a:r>
-          </a:p>
-        </p:txBody>
-      </p:sp>
+              <a:t>Création des </a:t>
+            </a:r>
+            <a:r>
+              <a:rPr lang="fr-FR" dirty="0" err="1" smtClean="0"/>
+              <a:t>beans</a:t>
+            </a:r>
+            <a:endParaRPr lang="fr-FR" dirty="0" smtClean="0"/>
+          </a:p>
+          <a:p>
+            <a:r>
+              <a:rPr lang="fr-FR" dirty="0" err="1" smtClean="0"/>
+              <a:t>Mapping</a:t>
+            </a:r>
+            <a:r>
+              <a:rPr lang="fr-FR" dirty="0" smtClean="0"/>
+              <a:t> des classes en vue de la création des tables dans la </a:t>
+            </a:r>
+            <a:r>
+              <a:rPr lang="fr-FR" dirty="0" err="1" smtClean="0"/>
+              <a:t>database</a:t>
+            </a:r>
+            <a:endParaRPr lang="fr-FR" dirty="0" smtClean="0"/>
+          </a:p>
+          <a:p>
+            <a:r>
+              <a:rPr lang="fr-FR" dirty="0" smtClean="0"/>
+              <a:t>Création des DAO pour chaque table de la DB, réalisation du CRUD</a:t>
+            </a:r>
+          </a:p>
+          <a:p>
+            <a:r>
+              <a:rPr lang="fr-FR" dirty="0" smtClean="0"/>
+              <a:t>Création des contrôleurs</a:t>
+            </a:r>
+          </a:p>
+          <a:p>
+            <a:r>
+              <a:rPr lang="fr-FR" dirty="0" smtClean="0"/>
+              <a:t>Création des JSP</a:t>
+            </a:r>
+          </a:p>
+          <a:p>
+            <a:r>
+              <a:rPr lang="fr-FR" dirty="0" smtClean="0"/>
+              <a:t>Validation de données</a:t>
+            </a:r>
+          </a:p>
+          <a:p>
+            <a:r>
+              <a:rPr lang="fr-FR" dirty="0" smtClean="0"/>
+              <a:t>Validation des fonctionnalités</a:t>
+            </a:r>
+          </a:p>
+          <a:p>
+            <a:r>
+              <a:rPr lang="fr-FR" dirty="0" smtClean="0"/>
+              <a:t>Implémentation de l’authentification et de la sécurité</a:t>
+            </a:r>
+          </a:p>
+          <a:p>
+            <a:r>
+              <a:rPr lang="fr-FR" dirty="0" smtClean="0"/>
+              <a:t>Ajout de </a:t>
+            </a:r>
+            <a:r>
+              <a:rPr lang="fr-FR" dirty="0"/>
+              <a:t>cosmétique HTML pour </a:t>
+            </a:r>
+            <a:r>
+              <a:rPr lang="fr-FR" dirty="0" smtClean="0"/>
+              <a:t>apparition</a:t>
+            </a:r>
+          </a:p>
+          <a:p>
+            <a:r>
+              <a:rPr lang="fr-FR" dirty="0" smtClean="0"/>
+              <a:t>Travail collaboratif avec Git; partage, récupération et fusion du code produit par chacun pas à pas.</a:t>
+            </a:r>
+            <a:endParaRPr lang="fr-FR" dirty="0" smtClean="0"/>
+          </a:p>
+        </p:txBody>
+      </p:sp>
+    </p:spTree>
+    <p:extLst>
+      <p:ext uri="{BB962C8B-B14F-4D97-AF65-F5344CB8AC3E}">
+        <p14:creationId xmlns:p14="http://schemas.microsoft.com/office/powerpoint/2010/main" val="382261260"/>
+      </p:ext>
+    </p:extLst>
+  </p:cSld>
+  <p:clrMapOvr>
+    <a:masterClrMapping/>
+  </p:clrMapOvr>
+  <p:timing>
+    <p:tnLst>
+      <p:par>
+        <p:cTn id="1" dur="indefinite" restart="never" nodeType="tmRoot"/>
+      </p:par>
+    </p:tnLst>
+  </p:timing>
+</p:sld>
+</file>
+
+<file path=ppt/slides/slide11.xml><?xml version="1.0" encoding="utf-8"?>
+<p:sld xmlns:a="http://schemas.openxmlformats.org/drawingml/2006/main" xmlns:r="http://schemas.openxmlformats.org/officeDocument/2006/relationships" xmlns:p="http://schemas.openxmlformats.org/presentationml/2006/main">
+  <p:cSld>
+    <p:spTree>
+      <p:nvGrpSpPr>
+        <p:cNvPr id="1" name=""/>
+        <p:cNvGrpSpPr/>
+        <p:nvPr/>
+      </p:nvGrpSpPr>
+      <p:grpSpPr>
+        <a:xfrm>
+          <a:off x="0" y="0"/>
+          <a:ext cx="0" cy="0"/>
+          <a:chOff x="0" y="0"/>
+          <a:chExt cx="0" cy="0"/>
+        </a:xfrm>
+      </p:grpSpPr>
+      <p:sp>
+        <p:nvSpPr>
+          <p:cNvPr id="2" name="Titre 1"/>
+          <p:cNvSpPr>
+            <a:spLocks noGrp="1"/>
+          </p:cNvSpPr>
+          <p:nvPr>
+            <p:ph type="title"/>
+          </p:nvPr>
+        </p:nvSpPr>
+        <p:spPr>
+          <a:xfrm>
+            <a:off x="1945201" y="624110"/>
+            <a:ext cx="6589199" cy="788666"/>
+          </a:xfrm>
+        </p:spPr>
+        <p:txBody>
+          <a:bodyPr/>
+          <a:lstStyle/>
+          <a:p>
+            <a:r>
+              <a:rPr lang="fr-FR" dirty="0" smtClean="0"/>
+              <a:t>Tests</a:t>
+            </a:r>
+            <a:endParaRPr lang="fr-FR" dirty="0"/>
+          </a:p>
+        </p:txBody>
+      </p:sp>
+      <p:sp>
+        <p:nvSpPr>
+          <p:cNvPr id="5" name="Espace réservé du contenu 2"/>
+          <p:cNvSpPr txBox="1">
+            <a:spLocks/>
+          </p:cNvSpPr>
+          <p:nvPr/>
+        </p:nvSpPr>
+        <p:spPr>
+          <a:xfrm>
+            <a:off x="1940455" y="1484784"/>
+            <a:ext cx="6591985" cy="3528392"/>
+          </a:xfrm>
+          <a:prstGeom prst="rect">
+            <a:avLst/>
+          </a:prstGeom>
+        </p:spPr>
+        <p:txBody>
+          <a:bodyPr vert="horz" lIns="91440" tIns="45720" rIns="91440" bIns="45720" rtlCol="0">
+            <a:normAutofit/>
+          </a:bodyPr>
+          <a:lstStyle>
+            <a:lvl1pPr marL="342900" indent="-342900" algn="l" defTabSz="457200" rtl="0" eaLnBrk="1" latinLnBrk="0" hangingPunct="1">
+              <a:spcBef>
+                <a:spcPts val="1000"/>
+              </a:spcBef>
+              <a:spcAft>
+                <a:spcPts val="0"/>
+              </a:spcAft>
+              <a:buClr>
+                <a:schemeClr val="accent1"/>
+              </a:buClr>
+              <a:buFont typeface="Wingdings 3" charset="2"/>
+              <a:buChar char=""/>
+              <a:defRPr sz="1800" kern="1200">
+                <a:solidFill>
+                  <a:schemeClr val="tx1">
+                    <a:lumMod val="75000"/>
+                    <a:lumOff val="25000"/>
+                  </a:schemeClr>
+                </a:solidFill>
+                <a:latin typeface="+mn-lt"/>
+                <a:ea typeface="+mn-ea"/>
+                <a:cs typeface="+mn-cs"/>
+              </a:defRPr>
+            </a:lvl1pPr>
+            <a:lvl2pPr marL="742950" indent="-285750" algn="l" defTabSz="457200" rtl="0" eaLnBrk="1" latinLnBrk="0" hangingPunct="1">
+              <a:spcBef>
+                <a:spcPts val="1000"/>
+              </a:spcBef>
+              <a:spcAft>
+                <a:spcPts val="0"/>
+              </a:spcAft>
+              <a:buClr>
+                <a:schemeClr val="accent1"/>
+              </a:buClr>
+              <a:buFont typeface="Wingdings 3" charset="2"/>
+              <a:buChar char=""/>
+              <a:defRPr sz="1600" kern="1200">
+                <a:solidFill>
+                  <a:schemeClr val="tx1">
+                    <a:lumMod val="75000"/>
+                    <a:lumOff val="25000"/>
+                  </a:schemeClr>
+                </a:solidFill>
+                <a:latin typeface="+mn-lt"/>
+                <a:ea typeface="+mn-ea"/>
+                <a:cs typeface="+mn-cs"/>
+              </a:defRPr>
+            </a:lvl2pPr>
+            <a:lvl3pPr marL="1143000" indent="-228600" algn="l" defTabSz="457200" rtl="0" eaLnBrk="1" latinLnBrk="0" hangingPunct="1">
+              <a:spcBef>
+                <a:spcPts val="1000"/>
+              </a:spcBef>
+              <a:spcAft>
+                <a:spcPts val="0"/>
+              </a:spcAft>
+              <a:buClr>
+                <a:schemeClr val="accent1"/>
+              </a:buClr>
+              <a:buFont typeface="Wingdings 3" charset="2"/>
+              <a:buChar char=""/>
+              <a:defRPr sz="1400" kern="1200">
+                <a:solidFill>
+                  <a:schemeClr val="tx1">
+                    <a:lumMod val="75000"/>
+                    <a:lumOff val="25000"/>
+                  </a:schemeClr>
+                </a:solidFill>
+                <a:latin typeface="+mn-lt"/>
+                <a:ea typeface="+mn-ea"/>
+                <a:cs typeface="+mn-cs"/>
+              </a:defRPr>
+            </a:lvl3pPr>
+            <a:lvl4pPr marL="1600200" indent="-228600" algn="l" defTabSz="457200" rtl="0" eaLnBrk="1" latinLnBrk="0" hangingPunct="1">
+              <a:spcBef>
+                <a:spcPts val="1000"/>
+              </a:spcBef>
+              <a:spcAft>
+                <a:spcPts val="0"/>
+              </a:spcAft>
+              <a:buClr>
+                <a:schemeClr val="accent1"/>
+              </a:buClr>
+              <a:buFont typeface="Wingdings 3" charset="2"/>
+              <a:buChar char=""/>
+              <a:defRPr sz="1200" kern="1200">
+                <a:solidFill>
+                  <a:schemeClr val="tx1">
+                    <a:lumMod val="75000"/>
+                    <a:lumOff val="25000"/>
+                  </a:schemeClr>
+                </a:solidFill>
+                <a:latin typeface="+mn-lt"/>
+                <a:ea typeface="+mn-ea"/>
+                <a:cs typeface="+mn-cs"/>
+              </a:defRPr>
+            </a:lvl4pPr>
+            <a:lvl5pPr marL="2057400" indent="-228600" algn="l" defTabSz="457200" rtl="0" eaLnBrk="1" latinLnBrk="0" hangingPunct="1">
+              <a:spcBef>
+                <a:spcPts val="1000"/>
+              </a:spcBef>
+              <a:spcAft>
+                <a:spcPts val="0"/>
+              </a:spcAft>
+              <a:buClr>
+                <a:schemeClr val="accent1"/>
+              </a:buClr>
+              <a:buFont typeface="Wingdings 3" charset="2"/>
+              <a:buChar char=""/>
+              <a:defRPr sz="1200" kern="1200">
+                <a:solidFill>
+                  <a:schemeClr val="tx1">
+                    <a:lumMod val="75000"/>
+                    <a:lumOff val="25000"/>
+                  </a:schemeClr>
+                </a:solidFill>
+                <a:latin typeface="+mn-lt"/>
+                <a:ea typeface="+mn-ea"/>
+                <a:cs typeface="+mn-cs"/>
+              </a:defRPr>
+            </a:lvl5pPr>
+            <a:lvl6pPr marL="2514600" indent="-228600" algn="l" defTabSz="457200" rtl="0" eaLnBrk="1" latinLnBrk="0" hangingPunct="1">
+              <a:spcBef>
+                <a:spcPts val="1000"/>
+              </a:spcBef>
+              <a:spcAft>
+                <a:spcPts val="0"/>
+              </a:spcAft>
+              <a:buClr>
+                <a:schemeClr val="accent1"/>
+              </a:buClr>
+              <a:buFont typeface="Wingdings 3" charset="2"/>
+              <a:buChar char=""/>
+              <a:defRPr sz="1200" kern="1200">
+                <a:solidFill>
+                  <a:schemeClr val="tx1">
+                    <a:lumMod val="75000"/>
+                    <a:lumOff val="25000"/>
+                  </a:schemeClr>
+                </a:solidFill>
+                <a:latin typeface="+mn-lt"/>
+                <a:ea typeface="+mn-ea"/>
+                <a:cs typeface="+mn-cs"/>
+              </a:defRPr>
+            </a:lvl6pPr>
+            <a:lvl7pPr marL="2971800" indent="-228600" algn="l" defTabSz="457200" rtl="0" eaLnBrk="1" latinLnBrk="0" hangingPunct="1">
+              <a:spcBef>
+                <a:spcPts val="1000"/>
+              </a:spcBef>
+              <a:spcAft>
+                <a:spcPts val="0"/>
+              </a:spcAft>
+              <a:buClr>
+                <a:schemeClr val="accent1"/>
+              </a:buClr>
+              <a:buFont typeface="Wingdings 3" charset="2"/>
+              <a:buChar char=""/>
+              <a:defRPr sz="1200" kern="1200">
+                <a:solidFill>
+                  <a:schemeClr val="tx1">
+                    <a:lumMod val="75000"/>
+                    <a:lumOff val="25000"/>
+                  </a:schemeClr>
+                </a:solidFill>
+                <a:latin typeface="+mn-lt"/>
+                <a:ea typeface="+mn-ea"/>
+                <a:cs typeface="+mn-cs"/>
+              </a:defRPr>
+            </a:lvl7pPr>
+            <a:lvl8pPr marL="3429000" indent="-228600" algn="l" defTabSz="457200" rtl="0" eaLnBrk="1" latinLnBrk="0" hangingPunct="1">
+              <a:spcBef>
+                <a:spcPts val="1000"/>
+              </a:spcBef>
+              <a:spcAft>
+                <a:spcPts val="0"/>
+              </a:spcAft>
+              <a:buClr>
+                <a:schemeClr val="accent1"/>
+              </a:buClr>
+              <a:buFont typeface="Wingdings 3" charset="2"/>
+              <a:buChar char=""/>
+              <a:defRPr sz="1200" kern="1200">
+                <a:solidFill>
+                  <a:schemeClr val="tx1">
+                    <a:lumMod val="75000"/>
+                    <a:lumOff val="25000"/>
+                  </a:schemeClr>
+                </a:solidFill>
+                <a:latin typeface="+mn-lt"/>
+                <a:ea typeface="+mn-ea"/>
+                <a:cs typeface="+mn-cs"/>
+              </a:defRPr>
+            </a:lvl8pPr>
+            <a:lvl9pPr marL="3886200" indent="-228600" algn="l" defTabSz="457200" rtl="0" eaLnBrk="1" latinLnBrk="0" hangingPunct="1">
+              <a:spcBef>
+                <a:spcPts val="1000"/>
+              </a:spcBef>
+              <a:spcAft>
+                <a:spcPts val="0"/>
+              </a:spcAft>
+              <a:buClr>
+                <a:schemeClr val="accent1"/>
+              </a:buClr>
+              <a:buFont typeface="Wingdings 3" charset="2"/>
+              <a:buChar char=""/>
+              <a:defRPr sz="1200" kern="1200">
+                <a:solidFill>
+                  <a:schemeClr val="tx1">
+                    <a:lumMod val="75000"/>
+                    <a:lumOff val="25000"/>
+                  </a:schemeClr>
+                </a:solidFill>
+                <a:latin typeface="+mn-lt"/>
+                <a:ea typeface="+mn-ea"/>
+                <a:cs typeface="+mn-cs"/>
+              </a:defRPr>
+            </a:lvl9pPr>
+          </a:lstStyle>
+          <a:p>
+            <a:r>
+              <a:rPr lang="fr-FR" dirty="0" smtClean="0"/>
+              <a:t>Validation des fonctionnalités pas à pas</a:t>
+            </a:r>
+          </a:p>
+          <a:p>
+            <a:r>
+              <a:rPr lang="fr-FR" dirty="0" smtClean="0"/>
+              <a:t>Validation du déroulement des scénarios définis dans les Use Cases</a:t>
+            </a:r>
+          </a:p>
+          <a:p>
+            <a:r>
+              <a:rPr lang="fr-FR" dirty="0" smtClean="0"/>
+              <a:t>Validation de la sécurité par authentification</a:t>
+            </a:r>
+          </a:p>
+          <a:p>
+            <a:r>
+              <a:rPr lang="fr-FR" dirty="0" smtClean="0"/>
+              <a:t>Validation de la robustesse de l’application</a:t>
+            </a:r>
+          </a:p>
+          <a:p>
+            <a:endParaRPr lang="fr-FR" dirty="0" smtClean="0"/>
+          </a:p>
+        </p:txBody>
+      </p:sp>
+    </p:spTree>
+    <p:extLst>
+      <p:ext uri="{BB962C8B-B14F-4D97-AF65-F5344CB8AC3E}">
+        <p14:creationId xmlns:p14="http://schemas.microsoft.com/office/powerpoint/2010/main" val="2096086804"/>
+      </p:ext>
+    </p:extLst>
+  </p:cSld>
+  <p:clrMapOvr>
+    <a:masterClrMapping/>
+  </p:clrMapOvr>
+  <p:timing>
+    <p:tnLst>
+      <p:par>
+        <p:cTn id="1" dur="indefinite" restart="never" nodeType="tmRoot"/>
+      </p:par>
+    </p:tnLst>
+  </p:timing>
+</p:sld>
+</file>
+
+<file path=ppt/slides/slide12.xml><?xml version="1.0" encoding="utf-8"?>
+<p:sld xmlns:a="http://schemas.openxmlformats.org/drawingml/2006/main" xmlns:r="http://schemas.openxmlformats.org/officeDocument/2006/relationships" xmlns:p="http://schemas.openxmlformats.org/presentationml/2006/main">
+  <p:cSld>
+    <p:spTree>
+      <p:nvGrpSpPr>
+        <p:cNvPr id="1" name=""/>
+        <p:cNvGrpSpPr/>
+        <p:nvPr/>
+      </p:nvGrpSpPr>
+      <p:grpSpPr>
+        <a:xfrm>
+          <a:off x="0" y="0"/>
+          <a:ext cx="0" cy="0"/>
+          <a:chOff x="0" y="0"/>
+          <a:chExt cx="0" cy="0"/>
+        </a:xfrm>
+      </p:grpSpPr>
+      <p:sp>
+        <p:nvSpPr>
+          <p:cNvPr id="2" name="Titre 1"/>
+          <p:cNvSpPr>
+            <a:spLocks noGrp="1"/>
+          </p:cNvSpPr>
+          <p:nvPr>
+            <p:ph type="title"/>
+          </p:nvPr>
+        </p:nvSpPr>
+        <p:spPr>
+          <a:xfrm>
+            <a:off x="1945201" y="624110"/>
+            <a:ext cx="6589199" cy="788666"/>
+          </a:xfrm>
+        </p:spPr>
+        <p:txBody>
+          <a:bodyPr/>
+          <a:lstStyle/>
+          <a:p>
+            <a:r>
+              <a:rPr lang="fr-FR" dirty="0" smtClean="0"/>
+              <a:t>Conduite du projet</a:t>
+            </a:r>
+            <a:endParaRPr lang="fr-FR" dirty="0"/>
+          </a:p>
+        </p:txBody>
+      </p:sp>
+      <p:sp>
+        <p:nvSpPr>
+          <p:cNvPr id="5" name="Espace réservé du contenu 2"/>
+          <p:cNvSpPr txBox="1">
+            <a:spLocks/>
+          </p:cNvSpPr>
+          <p:nvPr/>
+        </p:nvSpPr>
+        <p:spPr>
+          <a:xfrm>
+            <a:off x="1940455" y="1484784"/>
+            <a:ext cx="6591985" cy="3528392"/>
+          </a:xfrm>
+          <a:prstGeom prst="rect">
+            <a:avLst/>
+          </a:prstGeom>
+        </p:spPr>
+        <p:txBody>
+          <a:bodyPr vert="horz" lIns="91440" tIns="45720" rIns="91440" bIns="45720" rtlCol="0">
+            <a:normAutofit/>
+          </a:bodyPr>
+          <a:lstStyle>
+            <a:lvl1pPr marL="342900" indent="-342900" algn="l" defTabSz="457200" rtl="0" eaLnBrk="1" latinLnBrk="0" hangingPunct="1">
+              <a:spcBef>
+                <a:spcPts val="1000"/>
+              </a:spcBef>
+              <a:spcAft>
+                <a:spcPts val="0"/>
+              </a:spcAft>
+              <a:buClr>
+                <a:schemeClr val="accent1"/>
+              </a:buClr>
+              <a:buFont typeface="Wingdings 3" charset="2"/>
+              <a:buChar char=""/>
+              <a:defRPr sz="1800" kern="1200">
+                <a:solidFill>
+                  <a:schemeClr val="tx1">
+                    <a:lumMod val="75000"/>
+                    <a:lumOff val="25000"/>
+                  </a:schemeClr>
+                </a:solidFill>
+                <a:latin typeface="+mn-lt"/>
+                <a:ea typeface="+mn-ea"/>
+                <a:cs typeface="+mn-cs"/>
+              </a:defRPr>
+            </a:lvl1pPr>
+            <a:lvl2pPr marL="742950" indent="-285750" algn="l" defTabSz="457200" rtl="0" eaLnBrk="1" latinLnBrk="0" hangingPunct="1">
+              <a:spcBef>
+                <a:spcPts val="1000"/>
+              </a:spcBef>
+              <a:spcAft>
+                <a:spcPts val="0"/>
+              </a:spcAft>
+              <a:buClr>
+                <a:schemeClr val="accent1"/>
+              </a:buClr>
+              <a:buFont typeface="Wingdings 3" charset="2"/>
+              <a:buChar char=""/>
+              <a:defRPr sz="1600" kern="1200">
+                <a:solidFill>
+                  <a:schemeClr val="tx1">
+                    <a:lumMod val="75000"/>
+                    <a:lumOff val="25000"/>
+                  </a:schemeClr>
+                </a:solidFill>
+                <a:latin typeface="+mn-lt"/>
+                <a:ea typeface="+mn-ea"/>
+                <a:cs typeface="+mn-cs"/>
+              </a:defRPr>
+            </a:lvl2pPr>
+            <a:lvl3pPr marL="1143000" indent="-228600" algn="l" defTabSz="457200" rtl="0" eaLnBrk="1" latinLnBrk="0" hangingPunct="1">
+              <a:spcBef>
+                <a:spcPts val="1000"/>
+              </a:spcBef>
+              <a:spcAft>
+                <a:spcPts val="0"/>
+              </a:spcAft>
+              <a:buClr>
+                <a:schemeClr val="accent1"/>
+              </a:buClr>
+              <a:buFont typeface="Wingdings 3" charset="2"/>
+              <a:buChar char=""/>
+              <a:defRPr sz="1400" kern="1200">
+                <a:solidFill>
+                  <a:schemeClr val="tx1">
+                    <a:lumMod val="75000"/>
+                    <a:lumOff val="25000"/>
+                  </a:schemeClr>
+                </a:solidFill>
+                <a:latin typeface="+mn-lt"/>
+                <a:ea typeface="+mn-ea"/>
+                <a:cs typeface="+mn-cs"/>
+              </a:defRPr>
+            </a:lvl3pPr>
+            <a:lvl4pPr marL="1600200" indent="-228600" algn="l" defTabSz="457200" rtl="0" eaLnBrk="1" latinLnBrk="0" hangingPunct="1">
+              <a:spcBef>
+                <a:spcPts val="1000"/>
+              </a:spcBef>
+              <a:spcAft>
+                <a:spcPts val="0"/>
+              </a:spcAft>
+              <a:buClr>
+                <a:schemeClr val="accent1"/>
+              </a:buClr>
+              <a:buFont typeface="Wingdings 3" charset="2"/>
+              <a:buChar char=""/>
+              <a:defRPr sz="1200" kern="1200">
+                <a:solidFill>
+                  <a:schemeClr val="tx1">
+                    <a:lumMod val="75000"/>
+                    <a:lumOff val="25000"/>
+                  </a:schemeClr>
+                </a:solidFill>
+                <a:latin typeface="+mn-lt"/>
+                <a:ea typeface="+mn-ea"/>
+                <a:cs typeface="+mn-cs"/>
+              </a:defRPr>
+            </a:lvl4pPr>
+            <a:lvl5pPr marL="2057400" indent="-228600" algn="l" defTabSz="457200" rtl="0" eaLnBrk="1" latinLnBrk="0" hangingPunct="1">
+              <a:spcBef>
+                <a:spcPts val="1000"/>
+              </a:spcBef>
+              <a:spcAft>
+                <a:spcPts val="0"/>
+              </a:spcAft>
+              <a:buClr>
+                <a:schemeClr val="accent1"/>
+              </a:buClr>
+              <a:buFont typeface="Wingdings 3" charset="2"/>
+              <a:buChar char=""/>
+              <a:defRPr sz="1200" kern="1200">
+                <a:solidFill>
+                  <a:schemeClr val="tx1">
+                    <a:lumMod val="75000"/>
+                    <a:lumOff val="25000"/>
+                  </a:schemeClr>
+                </a:solidFill>
+                <a:latin typeface="+mn-lt"/>
+                <a:ea typeface="+mn-ea"/>
+                <a:cs typeface="+mn-cs"/>
+              </a:defRPr>
+            </a:lvl5pPr>
+            <a:lvl6pPr marL="2514600" indent="-228600" algn="l" defTabSz="457200" rtl="0" eaLnBrk="1" latinLnBrk="0" hangingPunct="1">
+              <a:spcBef>
+                <a:spcPts val="1000"/>
+              </a:spcBef>
+              <a:spcAft>
+                <a:spcPts val="0"/>
+              </a:spcAft>
+              <a:buClr>
+                <a:schemeClr val="accent1"/>
+              </a:buClr>
+              <a:buFont typeface="Wingdings 3" charset="2"/>
+              <a:buChar char=""/>
+              <a:defRPr sz="1200" kern="1200">
+                <a:solidFill>
+                  <a:schemeClr val="tx1">
+                    <a:lumMod val="75000"/>
+                    <a:lumOff val="25000"/>
+                  </a:schemeClr>
+                </a:solidFill>
+                <a:latin typeface="+mn-lt"/>
+                <a:ea typeface="+mn-ea"/>
+                <a:cs typeface="+mn-cs"/>
+              </a:defRPr>
+            </a:lvl6pPr>
+            <a:lvl7pPr marL="2971800" indent="-228600" algn="l" defTabSz="457200" rtl="0" eaLnBrk="1" latinLnBrk="0" hangingPunct="1">
+              <a:spcBef>
+                <a:spcPts val="1000"/>
+              </a:spcBef>
+              <a:spcAft>
+                <a:spcPts val="0"/>
+              </a:spcAft>
+              <a:buClr>
+                <a:schemeClr val="accent1"/>
+              </a:buClr>
+              <a:buFont typeface="Wingdings 3" charset="2"/>
+              <a:buChar char=""/>
+              <a:defRPr sz="1200" kern="1200">
+                <a:solidFill>
+                  <a:schemeClr val="tx1">
+                    <a:lumMod val="75000"/>
+                    <a:lumOff val="25000"/>
+                  </a:schemeClr>
+                </a:solidFill>
+                <a:latin typeface="+mn-lt"/>
+                <a:ea typeface="+mn-ea"/>
+                <a:cs typeface="+mn-cs"/>
+              </a:defRPr>
+            </a:lvl7pPr>
+            <a:lvl8pPr marL="3429000" indent="-228600" algn="l" defTabSz="457200" rtl="0" eaLnBrk="1" latinLnBrk="0" hangingPunct="1">
+              <a:spcBef>
+                <a:spcPts val="1000"/>
+              </a:spcBef>
+              <a:spcAft>
+                <a:spcPts val="0"/>
+              </a:spcAft>
+              <a:buClr>
+                <a:schemeClr val="accent1"/>
+              </a:buClr>
+              <a:buFont typeface="Wingdings 3" charset="2"/>
+              <a:buChar char=""/>
+              <a:defRPr sz="1200" kern="1200">
+                <a:solidFill>
+                  <a:schemeClr val="tx1">
+                    <a:lumMod val="75000"/>
+                    <a:lumOff val="25000"/>
+                  </a:schemeClr>
+                </a:solidFill>
+                <a:latin typeface="+mn-lt"/>
+                <a:ea typeface="+mn-ea"/>
+                <a:cs typeface="+mn-cs"/>
+              </a:defRPr>
+            </a:lvl8pPr>
+            <a:lvl9pPr marL="3886200" indent="-228600" algn="l" defTabSz="457200" rtl="0" eaLnBrk="1" latinLnBrk="0" hangingPunct="1">
+              <a:spcBef>
+                <a:spcPts val="1000"/>
+              </a:spcBef>
+              <a:spcAft>
+                <a:spcPts val="0"/>
+              </a:spcAft>
+              <a:buClr>
+                <a:schemeClr val="accent1"/>
+              </a:buClr>
+              <a:buFont typeface="Wingdings 3" charset="2"/>
+              <a:buChar char=""/>
+              <a:defRPr sz="1200" kern="1200">
+                <a:solidFill>
+                  <a:schemeClr val="tx1">
+                    <a:lumMod val="75000"/>
+                    <a:lumOff val="25000"/>
+                  </a:schemeClr>
+                </a:solidFill>
+                <a:latin typeface="+mn-lt"/>
+                <a:ea typeface="+mn-ea"/>
+                <a:cs typeface="+mn-cs"/>
+              </a:defRPr>
+            </a:lvl9pPr>
+          </a:lstStyle>
+          <a:p>
+            <a:r>
+              <a:rPr lang="fr-FR" dirty="0" smtClean="0"/>
+              <a:t>Méthode Agile SCRUM</a:t>
+            </a:r>
+          </a:p>
+          <a:p>
+            <a:r>
+              <a:rPr lang="fr-FR" dirty="0" smtClean="0"/>
+              <a:t>Création des </a:t>
+            </a:r>
+          </a:p>
+          <a:p>
+            <a:r>
+              <a:rPr lang="fr-FR" dirty="0" smtClean="0"/>
+              <a:t>Daily meeting</a:t>
+            </a:r>
+          </a:p>
+          <a:p>
+            <a:endParaRPr lang="fr-FR" dirty="0" smtClean="0"/>
+          </a:p>
+          <a:p>
+            <a:endParaRPr lang="fr-FR" dirty="0" smtClean="0"/>
+          </a:p>
+        </p:txBody>
+      </p:sp>
+    </p:spTree>
+    <p:extLst>
+      <p:ext uri="{BB962C8B-B14F-4D97-AF65-F5344CB8AC3E}">
+        <p14:creationId xmlns:p14="http://schemas.microsoft.com/office/powerpoint/2010/main" val="2860232359"/>
+      </p:ext>
+    </p:extLst>
+  </p:cSld>
+  <p:clrMapOvr>
+    <a:masterClrMapping/>
+  </p:clrMapOvr>
+  <p:timing>
+    <p:tnLst>
+      <p:par>
+        <p:cTn id="1" dur="indefinite" restart="never" nodeType="tmRoot"/>
+      </p:par>
+    </p:tnLst>
+  </p:timing>
+</p:sld>
+</file>
+
+<file path=ppt/slides/slide2.xml><?xml version="1.0" encoding="utf-8"?>
+<p:sld xmlns:a="http://schemas.openxmlformats.org/drawingml/2006/main" xmlns:r="http://schemas.openxmlformats.org/officeDocument/2006/relationships" xmlns:p="http://schemas.openxmlformats.org/presentationml/2006/main">
+  <p:cSld>
+    <p:spTree>
+      <p:nvGrpSpPr>
+        <p:cNvPr id="1" name=""/>
+        <p:cNvGrpSpPr/>
+        <p:nvPr/>
+      </p:nvGrpSpPr>
+      <p:grpSpPr>
+        <a:xfrm>
+          <a:off x="0" y="0"/>
+          <a:ext cx="0" cy="0"/>
+          <a:chOff x="0" y="0"/>
+          <a:chExt cx="0" cy="0"/>
+        </a:xfrm>
+      </p:grpSpPr>
+      <p:sp>
+        <p:nvSpPr>
+          <p:cNvPr id="2" name="Titre 1"/>
+          <p:cNvSpPr>
+            <a:spLocks noGrp="1"/>
+          </p:cNvSpPr>
+          <p:nvPr>
+            <p:ph type="title"/>
+          </p:nvPr>
+        </p:nvSpPr>
+        <p:spPr>
+          <a:xfrm>
+            <a:off x="1945201" y="624110"/>
+            <a:ext cx="6589199" cy="788666"/>
+          </a:xfrm>
+        </p:spPr>
+        <p:txBody>
+          <a:bodyPr/>
+          <a:lstStyle/>
+          <a:p>
+            <a:r>
+              <a:rPr lang="fr-FR" dirty="0" smtClean="0"/>
+              <a:t>Conduite de la présentation</a:t>
+            </a:r>
+            <a:endParaRPr lang="fr-FR" dirty="0"/>
+          </a:p>
+        </p:txBody>
+      </p:sp>
+      <p:sp>
+        <p:nvSpPr>
+          <p:cNvPr id="3" name="Espace réservé du contenu 2"/>
+          <p:cNvSpPr>
+            <a:spLocks noGrp="1"/>
+          </p:cNvSpPr>
+          <p:nvPr>
+            <p:ph idx="1"/>
+          </p:nvPr>
+        </p:nvSpPr>
+        <p:spPr/>
+        <p:txBody>
+          <a:bodyPr>
+            <a:normAutofit/>
+          </a:bodyPr>
+          <a:lstStyle/>
+          <a:p>
+            <a:r>
+              <a:rPr lang="fr-FR" dirty="0" smtClean="0"/>
+              <a:t>Introduction</a:t>
+            </a:r>
+          </a:p>
+          <a:p>
+            <a:r>
+              <a:rPr lang="fr-FR" dirty="0" smtClean="0"/>
+              <a:t>Analyse du besoin</a:t>
+            </a:r>
+          </a:p>
+          <a:p>
+            <a:r>
+              <a:rPr lang="fr-FR" dirty="0" smtClean="0"/>
+              <a:t>Contraintes</a:t>
+            </a:r>
+          </a:p>
+          <a:p>
+            <a:r>
+              <a:rPr lang="fr-FR" dirty="0" smtClean="0"/>
+              <a:t>Solution technique</a:t>
+            </a:r>
+          </a:p>
+          <a:p>
+            <a:r>
+              <a:rPr lang="fr-FR" dirty="0" smtClean="0"/>
+              <a:t>Conception et modélisation</a:t>
+            </a:r>
+            <a:endParaRPr lang="fr-FR" dirty="0" smtClean="0"/>
+          </a:p>
+          <a:p>
+            <a:r>
+              <a:rPr lang="fr-FR" dirty="0" smtClean="0"/>
+              <a:t>Développement</a:t>
+            </a:r>
+          </a:p>
+          <a:p>
+            <a:r>
+              <a:rPr lang="fr-FR" dirty="0" smtClean="0"/>
+              <a:t>Tests</a:t>
+            </a:r>
+          </a:p>
+          <a:p>
+            <a:r>
+              <a:rPr lang="fr-FR" dirty="0"/>
+              <a:t>Conduite du projet</a:t>
+            </a:r>
+          </a:p>
+          <a:p>
+            <a:r>
+              <a:rPr lang="fr-FR" dirty="0" smtClean="0"/>
+              <a:t>Conclusion</a:t>
+            </a:r>
+            <a:endParaRPr lang="fr-FR" dirty="0"/>
+          </a:p>
+        </p:txBody>
+      </p:sp>
+    </p:spTree>
+    <p:extLst>
+      <p:ext uri="{BB962C8B-B14F-4D97-AF65-F5344CB8AC3E}">
+        <p14:creationId xmlns:p14="http://schemas.microsoft.com/office/powerpoint/2010/main" val="1835602533"/>
+      </p:ext>
+    </p:extLst>
+  </p:cSld>
+  <p:clrMapOvr>
+    <a:masterClrMapping/>
+  </p:clrMapOvr>
+  <p:timing>
+    <p:tnLst>
+      <p:par>
+        <p:cTn id="1" dur="indefinite" restart="never" nodeType="tmRoot"/>
+      </p:par>
+    </p:tnLst>
+  </p:timing>
+</p:sld>
+</file>
+
+<file path=ppt/slides/slide3.xml><?xml version="1.0" encoding="utf-8"?>
+<p:sld xmlns:a="http://schemas.openxmlformats.org/drawingml/2006/main" xmlns:r="http://schemas.openxmlformats.org/officeDocument/2006/relationships" xmlns:p="http://schemas.openxmlformats.org/presentationml/2006/main">
+  <p:cSld>
+    <p:spTree>
+      <p:nvGrpSpPr>
+        <p:cNvPr id="1" name=""/>
+        <p:cNvGrpSpPr/>
+        <p:nvPr/>
+      </p:nvGrpSpPr>
+      <p:grpSpPr>
+        <a:xfrm>
+          <a:off x="0" y="0"/>
+          <a:ext cx="0" cy="0"/>
+          <a:chOff x="0" y="0"/>
+          <a:chExt cx="0" cy="0"/>
+        </a:xfrm>
+      </p:grpSpPr>
+      <p:sp>
+        <p:nvSpPr>
+          <p:cNvPr id="2" name="Titre 1"/>
+          <p:cNvSpPr>
+            <a:spLocks noGrp="1"/>
+          </p:cNvSpPr>
+          <p:nvPr>
+            <p:ph type="title"/>
+          </p:nvPr>
+        </p:nvSpPr>
+        <p:spPr/>
+        <p:txBody>
+          <a:bodyPr/>
+          <a:lstStyle/>
+          <a:p>
+            <a:r>
+              <a:rPr lang="fr-FR" dirty="0" smtClean="0"/>
+              <a:t>Introduction</a:t>
+            </a:r>
+            <a:endParaRPr lang="fr-FR" dirty="0"/>
+          </a:p>
+        </p:txBody>
+      </p:sp>
+      <p:sp>
+        <p:nvSpPr>
+          <p:cNvPr id="3" name="Espace réservé du contenu 2"/>
+          <p:cNvSpPr>
+            <a:spLocks noGrp="1"/>
+          </p:cNvSpPr>
+          <p:nvPr>
+            <p:ph idx="1"/>
+          </p:nvPr>
+        </p:nvSpPr>
+        <p:spPr/>
+        <p:txBody>
+          <a:bodyPr>
+            <a:normAutofit fontScale="62500" lnSpcReduction="20000"/>
+          </a:bodyPr>
+          <a:lstStyle/>
+          <a:p>
+            <a:r>
+              <a:rPr lang="fr-FR" dirty="0" smtClean="0"/>
+              <a:t>Reconversion professionnelle</a:t>
+            </a:r>
+          </a:p>
+          <a:p>
+            <a:r>
+              <a:rPr lang="fr-FR" dirty="0" smtClean="0"/>
+              <a:t>Aboutissement d’une formation de 3,5 mois en informatique traitant de:</a:t>
+            </a:r>
+          </a:p>
+          <a:p>
+            <a:pPr lvl="1"/>
+            <a:r>
+              <a:rPr lang="fr-FR" dirty="0" smtClean="0"/>
+              <a:t>Conduite de projet méthode Agile SCRUM</a:t>
+            </a:r>
+          </a:p>
+          <a:p>
+            <a:pPr lvl="1"/>
+            <a:r>
+              <a:rPr lang="fr-FR" dirty="0"/>
+              <a:t>Apprentissage du langage </a:t>
+            </a:r>
+            <a:r>
+              <a:rPr lang="fr-FR" dirty="0" smtClean="0"/>
+              <a:t>UML</a:t>
+            </a:r>
+          </a:p>
+          <a:p>
+            <a:pPr lvl="1"/>
+            <a:r>
+              <a:rPr lang="fr-FR" dirty="0" smtClean="0"/>
+              <a:t>Apprentissage du langage Java</a:t>
+            </a:r>
+          </a:p>
+          <a:p>
+            <a:pPr lvl="1"/>
+            <a:r>
+              <a:rPr lang="fr-FR" dirty="0"/>
+              <a:t>Apprentissage du code HTML</a:t>
+            </a:r>
+          </a:p>
+          <a:p>
+            <a:pPr lvl="1"/>
+            <a:r>
+              <a:rPr lang="fr-FR" dirty="0" smtClean="0"/>
+              <a:t>Apprentissage </a:t>
+            </a:r>
+            <a:r>
+              <a:rPr lang="fr-FR" dirty="0"/>
+              <a:t>des </a:t>
+            </a:r>
+            <a:r>
+              <a:rPr lang="fr-FR" dirty="0" err="1"/>
+              <a:t>frameworks</a:t>
+            </a:r>
+            <a:r>
+              <a:rPr lang="fr-FR" dirty="0"/>
+              <a:t> </a:t>
+            </a:r>
+            <a:r>
+              <a:rPr lang="fr-FR" dirty="0" err="1"/>
+              <a:t>Spring</a:t>
+            </a:r>
+            <a:endParaRPr lang="fr-FR" dirty="0"/>
+          </a:p>
+          <a:p>
+            <a:pPr lvl="2"/>
+            <a:r>
+              <a:rPr lang="fr-FR" dirty="0" smtClean="0"/>
+              <a:t>Gestion des dépendances avec MAVEN</a:t>
+            </a:r>
+          </a:p>
+          <a:p>
+            <a:pPr lvl="2"/>
+            <a:r>
+              <a:rPr lang="fr-FR" dirty="0" smtClean="0"/>
+              <a:t>Gestion </a:t>
+            </a:r>
+            <a:r>
+              <a:rPr lang="fr-FR" dirty="0" smtClean="0"/>
+              <a:t>de base de donnée en langage </a:t>
+            </a:r>
+            <a:r>
+              <a:rPr lang="fr-FR" dirty="0" smtClean="0"/>
+              <a:t>SQL et avec </a:t>
+            </a:r>
+            <a:r>
+              <a:rPr lang="fr-FR" dirty="0" err="1" smtClean="0"/>
+              <a:t>Hibernate</a:t>
+            </a:r>
+            <a:endParaRPr lang="fr-FR" dirty="0" smtClean="0"/>
+          </a:p>
+          <a:p>
+            <a:pPr lvl="2"/>
+            <a:r>
+              <a:rPr lang="fr-FR" dirty="0" err="1" smtClean="0"/>
+              <a:t>Mapping</a:t>
+            </a:r>
+            <a:r>
+              <a:rPr lang="fr-FR" dirty="0" smtClean="0"/>
+              <a:t> des </a:t>
+            </a:r>
+            <a:r>
+              <a:rPr lang="fr-FR" dirty="0"/>
+              <a:t>bases de </a:t>
+            </a:r>
+            <a:r>
+              <a:rPr lang="fr-FR" dirty="0" smtClean="0"/>
+              <a:t>données relationnelles</a:t>
+            </a:r>
+            <a:endParaRPr lang="fr-FR" dirty="0"/>
+          </a:p>
+          <a:p>
+            <a:pPr lvl="2"/>
+            <a:r>
+              <a:rPr lang="fr-FR" dirty="0"/>
+              <a:t>MVC </a:t>
+            </a:r>
+            <a:endParaRPr lang="fr-FR" dirty="0" smtClean="0"/>
+          </a:p>
+          <a:p>
+            <a:pPr lvl="2"/>
+            <a:r>
+              <a:rPr lang="fr-FR" dirty="0" smtClean="0"/>
+              <a:t>Sécurité</a:t>
+            </a:r>
+          </a:p>
+          <a:p>
+            <a:pPr lvl="2"/>
+            <a:r>
+              <a:rPr lang="fr-FR" dirty="0"/>
+              <a:t>Développement collaboratif avec </a:t>
+            </a:r>
+            <a:r>
+              <a:rPr lang="fr-FR" dirty="0" smtClean="0"/>
+              <a:t>Git et GitHub</a:t>
+            </a:r>
+          </a:p>
+          <a:p>
+            <a:r>
+              <a:rPr lang="fr-FR" dirty="0" smtClean="0"/>
+              <a:t>Projet final mettant en œuvre les acquis de la formation basé sur un cahier des charges.</a:t>
+            </a:r>
+            <a:endParaRPr lang="fr-FR" dirty="0"/>
+          </a:p>
+          <a:p>
+            <a:pPr lvl="2"/>
+            <a:endParaRPr lang="fr-FR" dirty="0" smtClean="0"/>
+          </a:p>
+          <a:p>
+            <a:pPr lvl="2"/>
+            <a:endParaRPr lang="fr-FR" dirty="0"/>
+          </a:p>
+          <a:p>
+            <a:pPr lvl="2"/>
+            <a:endParaRPr lang="fr-FR" dirty="0" smtClean="0"/>
+          </a:p>
+          <a:p>
+            <a:pPr lvl="1"/>
+            <a:endParaRPr lang="fr-FR" dirty="0"/>
+          </a:p>
+        </p:txBody>
+      </p:sp>
+    </p:spTree>
+    <p:extLst>
+      <p:ext uri="{BB962C8B-B14F-4D97-AF65-F5344CB8AC3E}">
+        <p14:creationId xmlns:p14="http://schemas.microsoft.com/office/powerpoint/2010/main" val="1738298774"/>
+      </p:ext>
+    </p:extLst>
+  </p:cSld>
+  <p:clrMapOvr>
+    <a:masterClrMapping/>
+  </p:clrMapOvr>
+  <p:timing>
+    <p:tnLst>
+      <p:par>
+        <p:cTn id="1" dur="indefinite" restart="never" nodeType="tmRoot"/>
+      </p:par>
+    </p:tnLst>
+  </p:timing>
+</p:sld>
+</file>
+
+<file path=ppt/slides/slide4.xml><?xml version="1.0" encoding="utf-8"?>
+<p:sld xmlns:a="http://schemas.openxmlformats.org/drawingml/2006/main" xmlns:r="http://schemas.openxmlformats.org/officeDocument/2006/relationships" xmlns:p="http://schemas.openxmlformats.org/presentationml/2006/main">
+  <p:cSld>
+    <p:spTree>
+      <p:nvGrpSpPr>
+        <p:cNvPr id="1" name=""/>
+        <p:cNvGrpSpPr/>
+        <p:nvPr/>
+      </p:nvGrpSpPr>
+      <p:grpSpPr>
+        <a:xfrm>
+          <a:off x="0" y="0"/>
+          <a:ext cx="0" cy="0"/>
+          <a:chOff x="0" y="0"/>
+          <a:chExt cx="0" cy="0"/>
+        </a:xfrm>
+      </p:grpSpPr>
+      <p:pic>
+        <p:nvPicPr>
+          <p:cNvPr id="4" name="Image 3"/>
+          <p:cNvPicPr>
+            <a:picLocks noChangeAspect="1"/>
+          </p:cNvPicPr>
+          <p:nvPr/>
+        </p:nvPicPr>
+        <p:blipFill>
+          <a:blip r:embed="rId2" cstate="print">
+            <a:extLst>
+              <a:ext uri="{28A0092B-C50C-407E-A947-70E740481C1C}">
+                <a14:useLocalDpi xmlns:a14="http://schemas.microsoft.com/office/drawing/2010/main" val="0"/>
+              </a:ext>
+            </a:extLst>
+          </a:blip>
+          <a:stretch>
+            <a:fillRect/>
+          </a:stretch>
+        </p:blipFill>
+        <p:spPr>
+          <a:xfrm>
+            <a:off x="5580112" y="1556792"/>
+            <a:ext cx="2376264" cy="3636299"/>
+          </a:xfrm>
+          <a:prstGeom prst="rect">
+            <a:avLst/>
+          </a:prstGeom>
+          <a:ln>
+            <a:noFill/>
+          </a:ln>
+          <a:effectLst>
+            <a:softEdge rad="112500"/>
+          </a:effectLst>
+        </p:spPr>
+      </p:pic>
+      <p:sp>
+        <p:nvSpPr>
+          <p:cNvPr id="2" name="Titre 1"/>
+          <p:cNvSpPr>
+            <a:spLocks noGrp="1"/>
+          </p:cNvSpPr>
+          <p:nvPr>
+            <p:ph type="title"/>
+          </p:nvPr>
+        </p:nvSpPr>
+        <p:spPr>
+          <a:xfrm>
+            <a:off x="1945201" y="624110"/>
+            <a:ext cx="6589199" cy="644650"/>
+          </a:xfrm>
+        </p:spPr>
+        <p:txBody>
+          <a:bodyPr/>
+          <a:lstStyle/>
+          <a:p>
+            <a:r>
+              <a:rPr lang="fr-FR" dirty="0" smtClean="0"/>
+              <a:t>Analyse du besoin</a:t>
+            </a:r>
+            <a:endParaRPr lang="fr-FR" dirty="0"/>
+          </a:p>
+        </p:txBody>
+      </p:sp>
+      <p:sp>
+        <p:nvSpPr>
+          <p:cNvPr id="3" name="Espace réservé du contenu 2"/>
+          <p:cNvSpPr>
+            <a:spLocks noGrp="1"/>
+          </p:cNvSpPr>
+          <p:nvPr>
+            <p:ph idx="1"/>
+          </p:nvPr>
+        </p:nvSpPr>
+        <p:spPr>
+          <a:xfrm>
+            <a:off x="1945201" y="2852936"/>
+            <a:ext cx="6591985" cy="1439416"/>
+          </a:xfrm>
+        </p:spPr>
+        <p:txBody>
+          <a:bodyPr/>
+          <a:lstStyle/>
+          <a:p>
+            <a:r>
+              <a:rPr lang="fr-FR" dirty="0" smtClean="0"/>
+              <a:t>Capture du besoin</a:t>
+            </a:r>
+          </a:p>
+          <a:p>
+            <a:r>
+              <a:rPr lang="fr-FR" dirty="0" smtClean="0"/>
+              <a:t>Analyse du domaine</a:t>
+            </a:r>
+          </a:p>
+          <a:p>
+            <a:r>
+              <a:rPr lang="fr-FR" dirty="0" smtClean="0"/>
+              <a:t>Analyse du domaine objet</a:t>
+            </a:r>
+          </a:p>
+          <a:p>
+            <a:endParaRPr lang="fr-FR" dirty="0"/>
+          </a:p>
+        </p:txBody>
+      </p:sp>
+    </p:spTree>
+    <p:extLst>
+      <p:ext uri="{BB962C8B-B14F-4D97-AF65-F5344CB8AC3E}">
+        <p14:creationId xmlns:p14="http://schemas.microsoft.com/office/powerpoint/2010/main" val="2626397477"/>
+      </p:ext>
+    </p:extLst>
+  </p:cSld>
+  <p:clrMapOvr>
+    <a:masterClrMapping/>
+  </p:clrMapOvr>
+  <p:timing>
+    <p:tnLst>
+      <p:par>
+        <p:cTn id="1" dur="indefinite" restart="never" nodeType="tmRoot"/>
+      </p:par>
+    </p:tnLst>
+  </p:timing>
+</p:sld>
+</file>
+
+<file path=ppt/slides/slide5.xml><?xml version="1.0" encoding="utf-8"?>
+<p:sld xmlns:a="http://schemas.openxmlformats.org/drawingml/2006/main" xmlns:r="http://schemas.openxmlformats.org/officeDocument/2006/relationships" xmlns:p="http://schemas.openxmlformats.org/presentationml/2006/main">
+  <p:cSld>
+    <p:spTree>
+      <p:nvGrpSpPr>
+        <p:cNvPr id="1" name=""/>
+        <p:cNvGrpSpPr/>
+        <p:nvPr/>
+      </p:nvGrpSpPr>
+      <p:grpSpPr>
+        <a:xfrm>
+          <a:off x="0" y="0"/>
+          <a:ext cx="0" cy="0"/>
+          <a:chOff x="0" y="0"/>
+          <a:chExt cx="0" cy="0"/>
+        </a:xfrm>
+      </p:grpSpPr>
+      <p:pic>
+        <p:nvPicPr>
+          <p:cNvPr id="4" name="Image 3"/>
+          <p:cNvPicPr>
+            <a:picLocks noChangeAspect="1"/>
+          </p:cNvPicPr>
+          <p:nvPr/>
+        </p:nvPicPr>
+        <p:blipFill rotWithShape="1">
+          <a:blip r:embed="rId2" cstate="print">
+            <a:extLst>
+              <a:ext uri="{BEBA8EAE-BF5A-486C-A8C5-ECC9F3942E4B}">
+                <a14:imgProps xmlns:a14="http://schemas.microsoft.com/office/drawing/2010/main">
+                  <a14:imgLayer r:embed="rId3">
+                    <a14:imgEffect>
+                      <a14:brightnessContrast bright="20000" contrast="40000"/>
+                    </a14:imgEffect>
+                  </a14:imgLayer>
+                </a14:imgProps>
+              </a:ext>
+              <a:ext uri="{28A0092B-C50C-407E-A947-70E740481C1C}">
+                <a14:useLocalDpi xmlns:a14="http://schemas.microsoft.com/office/drawing/2010/main" val="0"/>
+              </a:ext>
+            </a:extLst>
+          </a:blip>
+          <a:srcRect l="14563" t="19291" r="9051" b="12312"/>
+          <a:stretch/>
+        </p:blipFill>
+        <p:spPr>
+          <a:xfrm>
+            <a:off x="5793933" y="1268760"/>
+            <a:ext cx="3278567" cy="1656184"/>
+          </a:xfrm>
+          <a:prstGeom prst="rect">
+            <a:avLst/>
+          </a:prstGeom>
+          <a:ln>
+            <a:noFill/>
+          </a:ln>
+          <a:effectLst>
+            <a:outerShdw blurRad="190500" algn="tl" rotWithShape="0">
+              <a:srgbClr val="000000">
+                <a:alpha val="70000"/>
+              </a:srgbClr>
+            </a:outerShdw>
+          </a:effectLst>
+        </p:spPr>
+      </p:pic>
+      <p:sp>
+        <p:nvSpPr>
+          <p:cNvPr id="2" name="Titre 1"/>
+          <p:cNvSpPr>
+            <a:spLocks noGrp="1"/>
+          </p:cNvSpPr>
+          <p:nvPr>
+            <p:ph type="title"/>
+          </p:nvPr>
+        </p:nvSpPr>
+        <p:spPr>
+          <a:xfrm>
+            <a:off x="1945201" y="624110"/>
+            <a:ext cx="6589199" cy="644650"/>
+          </a:xfrm>
+        </p:spPr>
+        <p:txBody>
+          <a:bodyPr/>
+          <a:lstStyle/>
+          <a:p>
+            <a:r>
+              <a:rPr lang="fr-FR" dirty="0" smtClean="0"/>
+              <a:t>Analyse du besoin</a:t>
+            </a:r>
+            <a:endParaRPr lang="fr-FR" dirty="0"/>
+          </a:p>
+        </p:txBody>
+      </p:sp>
+      <p:sp>
+        <p:nvSpPr>
+          <p:cNvPr id="3" name="Espace réservé du contenu 2"/>
+          <p:cNvSpPr>
+            <a:spLocks noGrp="1"/>
+          </p:cNvSpPr>
+          <p:nvPr>
+            <p:ph idx="1"/>
+          </p:nvPr>
+        </p:nvSpPr>
+        <p:spPr>
+          <a:xfrm>
+            <a:off x="1942415" y="1379570"/>
+            <a:ext cx="6591985" cy="3777622"/>
+          </a:xfrm>
+        </p:spPr>
+        <p:txBody>
+          <a:bodyPr/>
+          <a:lstStyle/>
+          <a:p>
+            <a:r>
+              <a:rPr lang="fr-FR" dirty="0" smtClean="0"/>
+              <a:t>Capture du besoin</a:t>
+            </a:r>
+          </a:p>
+          <a:p>
+            <a:pPr lvl="1"/>
+            <a:r>
+              <a:rPr lang="fr-FR" dirty="0" smtClean="0"/>
+              <a:t>Définition des Use Cases</a:t>
+            </a:r>
+          </a:p>
+          <a:p>
+            <a:pPr lvl="1"/>
+            <a:r>
+              <a:rPr lang="fr-FR" dirty="0" smtClean="0"/>
+              <a:t>Réalisation du Use Case </a:t>
+            </a:r>
+            <a:r>
+              <a:rPr lang="fr-FR" dirty="0" err="1" smtClean="0"/>
+              <a:t>Diagram</a:t>
+            </a:r>
+            <a:endParaRPr lang="fr-FR" dirty="0" smtClean="0"/>
+          </a:p>
+        </p:txBody>
+      </p:sp>
+      <p:pic>
+        <p:nvPicPr>
+          <p:cNvPr id="5" name="Image 4"/>
+          <p:cNvPicPr>
+            <a:picLocks noChangeAspect="1"/>
+          </p:cNvPicPr>
+          <p:nvPr/>
+        </p:nvPicPr>
+        <p:blipFill>
+          <a:blip r:embed="rId4">
+            <a:extLst>
+              <a:ext uri="{28A0092B-C50C-407E-A947-70E740481C1C}">
+                <a14:useLocalDpi xmlns:a14="http://schemas.microsoft.com/office/drawing/2010/main" val="0"/>
+              </a:ext>
+            </a:extLst>
+          </a:blip>
+          <a:stretch>
+            <a:fillRect/>
+          </a:stretch>
+        </p:blipFill>
+        <p:spPr>
+          <a:xfrm>
+            <a:off x="1475656" y="2492896"/>
+            <a:ext cx="4752528" cy="4233815"/>
+          </a:xfrm>
+          <a:prstGeom prst="rect">
+            <a:avLst/>
+          </a:prstGeom>
+          <a:ln>
+            <a:noFill/>
+          </a:ln>
+          <a:effectLst>
+            <a:outerShdw blurRad="190500" algn="tl" rotWithShape="0">
+              <a:srgbClr val="000000">
+                <a:alpha val="70000"/>
+              </a:srgbClr>
+            </a:outerShdw>
+          </a:effectLst>
+        </p:spPr>
+      </p:pic>
+    </p:spTree>
+    <p:extLst>
+      <p:ext uri="{BB962C8B-B14F-4D97-AF65-F5344CB8AC3E}">
+        <p14:creationId xmlns:p14="http://schemas.microsoft.com/office/powerpoint/2010/main" val="545282299"/>
+      </p:ext>
+    </p:extLst>
+  </p:cSld>
+  <p:clrMapOvr>
+    <a:masterClrMapping/>
+  </p:clrMapOvr>
+  <p:timing>
+    <p:tnLst>
+      <p:par>
+        <p:cTn id="1" dur="indefinite" restart="never" nodeType="tmRoot"/>
+      </p:par>
+    </p:tnLst>
+  </p:timing>
+</p:sld>
+</file>
+
+<file path=ppt/slides/slide6.xml><?xml version="1.0" encoding="utf-8"?>
+<p:sld xmlns:a="http://schemas.openxmlformats.org/drawingml/2006/main" xmlns:r="http://schemas.openxmlformats.org/officeDocument/2006/relationships" xmlns:p="http://schemas.openxmlformats.org/presentationml/2006/main">
+  <p:cSld>
+    <p:spTree>
+      <p:nvGrpSpPr>
+        <p:cNvPr id="1" name=""/>
+        <p:cNvGrpSpPr/>
+        <p:nvPr/>
+      </p:nvGrpSpPr>
+      <p:grpSpPr>
+        <a:xfrm>
+          <a:off x="0" y="0"/>
+          <a:ext cx="0" cy="0"/>
+          <a:chOff x="0" y="0"/>
+          <a:chExt cx="0" cy="0"/>
+        </a:xfrm>
+      </p:grpSpPr>
+      <p:sp>
+        <p:nvSpPr>
+          <p:cNvPr id="2" name="Titre 1"/>
+          <p:cNvSpPr>
+            <a:spLocks noGrp="1"/>
+          </p:cNvSpPr>
+          <p:nvPr>
+            <p:ph type="title"/>
+          </p:nvPr>
+        </p:nvSpPr>
+        <p:spPr>
+          <a:xfrm>
+            <a:off x="1945201" y="624110"/>
+            <a:ext cx="6589199" cy="644650"/>
+          </a:xfrm>
+        </p:spPr>
+        <p:txBody>
+          <a:bodyPr/>
+          <a:lstStyle/>
+          <a:p>
+            <a:r>
+              <a:rPr lang="fr-FR" dirty="0" smtClean="0"/>
+              <a:t>Analyse du besoin</a:t>
+            </a:r>
+            <a:endParaRPr lang="fr-FR" dirty="0"/>
+          </a:p>
+        </p:txBody>
+      </p:sp>
+      <p:sp>
+        <p:nvSpPr>
+          <p:cNvPr id="6" name="Espace réservé du contenu 2"/>
+          <p:cNvSpPr>
+            <a:spLocks noGrp="1"/>
+          </p:cNvSpPr>
+          <p:nvPr>
+            <p:ph idx="1"/>
+          </p:nvPr>
+        </p:nvSpPr>
+        <p:spPr>
+          <a:xfrm>
+            <a:off x="1942415" y="1379570"/>
+            <a:ext cx="6591985" cy="3777622"/>
+          </a:xfrm>
+        </p:spPr>
+        <p:txBody>
+          <a:bodyPr/>
+          <a:lstStyle/>
+          <a:p>
+            <a:r>
+              <a:rPr lang="fr-FR" dirty="0" smtClean="0"/>
+              <a:t>Analyse du domaine Objet</a:t>
+            </a:r>
+          </a:p>
+        </p:txBody>
+      </p:sp>
+      <p:pic>
+        <p:nvPicPr>
+          <p:cNvPr id="3" name="Image 2"/>
+          <p:cNvPicPr>
+            <a:picLocks noChangeAspect="1"/>
+          </p:cNvPicPr>
+          <p:nvPr/>
+        </p:nvPicPr>
+        <p:blipFill>
+          <a:blip r:embed="rId2">
+            <a:extLst>
+              <a:ext uri="{28A0092B-C50C-407E-A947-70E740481C1C}">
+                <a14:useLocalDpi xmlns:a14="http://schemas.microsoft.com/office/drawing/2010/main" val="0"/>
+              </a:ext>
+            </a:extLst>
+          </a:blip>
+          <a:stretch>
+            <a:fillRect/>
+          </a:stretch>
+        </p:blipFill>
+        <p:spPr>
+          <a:xfrm>
+            <a:off x="1259632" y="1772816"/>
+            <a:ext cx="7200800" cy="4960551"/>
+          </a:xfrm>
+          <a:prstGeom prst="rect">
+            <a:avLst/>
+          </a:prstGeom>
+          <a:ln>
+            <a:noFill/>
+          </a:ln>
+          <a:effectLst>
+            <a:outerShdw blurRad="190500" algn="tl" rotWithShape="0">
+              <a:srgbClr val="000000">
+                <a:alpha val="70000"/>
+              </a:srgbClr>
+            </a:outerShdw>
+          </a:effectLst>
+        </p:spPr>
+      </p:pic>
+      <p:sp>
+        <p:nvSpPr>
+          <p:cNvPr id="4" name="ZoneTexte 3"/>
+          <p:cNvSpPr txBox="1"/>
+          <p:nvPr/>
+        </p:nvSpPr>
+        <p:spPr>
+          <a:xfrm>
+            <a:off x="4716016" y="5373216"/>
+            <a:ext cx="3100529" cy="646331"/>
+          </a:xfrm>
+          <a:prstGeom prst="rect">
+            <a:avLst/>
+          </a:prstGeom>
+          <a:noFill/>
+        </p:spPr>
+        <p:txBody>
+          <a:bodyPr wrap="none" rtlCol="0">
+            <a:spAutoFit/>
+          </a:bodyPr>
+          <a:lstStyle/>
+          <a:p>
+            <a:r>
+              <a:rPr lang="fr-FR" dirty="0" smtClean="0">
+                <a:ln w="0"/>
+                <a:gradFill>
+                  <a:gsLst>
+                    <a:gs pos="0">
+                      <a:schemeClr val="accent5">
+                        <a:lumMod val="50000"/>
+                      </a:schemeClr>
+                    </a:gs>
+                    <a:gs pos="50000">
+                      <a:schemeClr val="accent5"/>
+                    </a:gs>
+                    <a:gs pos="100000">
+                      <a:schemeClr val="accent5">
+                        <a:lumMod val="60000"/>
+                        <a:lumOff val="40000"/>
+                      </a:schemeClr>
+                    </a:gs>
+                  </a:gsLst>
+                  <a:lin ang="5400000"/>
+                </a:gradFill>
+                <a:effectLst>
+                  <a:reflection blurRad="6350" stA="53000" endA="300" endPos="35500" dir="5400000" sy="-90000" algn="bl" rotWithShape="0"/>
+                </a:effectLst>
+              </a:rPr>
+              <a:t>Idée initiale du modèle objet</a:t>
+            </a:r>
+          </a:p>
+          <a:p>
+            <a:r>
+              <a:rPr lang="fr-FR" dirty="0" smtClean="0">
+                <a:ln w="0"/>
+                <a:gradFill>
+                  <a:gsLst>
+                    <a:gs pos="0">
+                      <a:schemeClr val="accent5">
+                        <a:lumMod val="50000"/>
+                      </a:schemeClr>
+                    </a:gs>
+                    <a:gs pos="50000">
+                      <a:schemeClr val="accent5"/>
+                    </a:gs>
+                    <a:gs pos="100000">
+                      <a:schemeClr val="accent5">
+                        <a:lumMod val="60000"/>
+                        <a:lumOff val="40000"/>
+                      </a:schemeClr>
+                    </a:gs>
+                  </a:gsLst>
+                  <a:lin ang="5400000"/>
+                </a:gradFill>
+                <a:effectLst>
+                  <a:reflection blurRad="6350" stA="53000" endA="300" endPos="35500" dir="5400000" sy="-90000" algn="bl" rotWithShape="0"/>
+                </a:effectLst>
+              </a:rPr>
+              <a:t>du projet</a:t>
+            </a:r>
+            <a:endParaRPr lang="fr-FR" dirty="0">
+              <a:ln w="0"/>
+              <a:gradFill>
+                <a:gsLst>
+                  <a:gs pos="0">
+                    <a:schemeClr val="accent5">
+                      <a:lumMod val="50000"/>
+                    </a:schemeClr>
+                  </a:gs>
+                  <a:gs pos="50000">
+                    <a:schemeClr val="accent5"/>
+                  </a:gs>
+                  <a:gs pos="100000">
+                    <a:schemeClr val="accent5">
+                      <a:lumMod val="60000"/>
+                      <a:lumOff val="40000"/>
+                    </a:schemeClr>
+                  </a:gs>
+                </a:gsLst>
+                <a:lin ang="5400000"/>
+              </a:gradFill>
+              <a:effectLst>
+                <a:reflection blurRad="6350" stA="53000" endA="300" endPos="35500" dir="5400000" sy="-90000" algn="bl" rotWithShape="0"/>
+              </a:effectLst>
+            </a:endParaRPr>
+          </a:p>
+        </p:txBody>
+      </p:sp>
+    </p:spTree>
+    <p:extLst>
+      <p:ext uri="{BB962C8B-B14F-4D97-AF65-F5344CB8AC3E}">
+        <p14:creationId xmlns:p14="http://schemas.microsoft.com/office/powerpoint/2010/main" val="2580400785"/>
+      </p:ext>
+    </p:extLst>
+  </p:cSld>
+  <p:clrMapOvr>
+    <a:masterClrMapping/>
+  </p:clrMapOvr>
+  <p:timing>
+    <p:tnLst>
+      <p:par>
+        <p:cTn id="1" dur="indefinite" restart="never" nodeType="tmRoot"/>
+      </p:par>
+    </p:tnLst>
+  </p:timing>
+</p:sld>
+</file>
+
+<file path=ppt/slides/slide7.xml><?xml version="1.0" encoding="utf-8"?>
+<p:sld xmlns:a="http://schemas.openxmlformats.org/drawingml/2006/main" xmlns:r="http://schemas.openxmlformats.org/officeDocument/2006/relationships" xmlns:p="http://schemas.openxmlformats.org/presentationml/2006/main">
+  <p:cSld>
+    <p:spTree>
+      <p:nvGrpSpPr>
+        <p:cNvPr id="1" name=""/>
+        <p:cNvGrpSpPr/>
+        <p:nvPr/>
+      </p:nvGrpSpPr>
+      <p:grpSpPr>
+        <a:xfrm>
+          <a:off x="0" y="0"/>
+          <a:ext cx="0" cy="0"/>
+          <a:chOff x="0" y="0"/>
+          <a:chExt cx="0" cy="0"/>
+        </a:xfrm>
+      </p:grpSpPr>
+      <p:sp>
+        <p:nvSpPr>
+          <p:cNvPr id="2" name="Titre 1"/>
+          <p:cNvSpPr>
+            <a:spLocks noGrp="1"/>
+          </p:cNvSpPr>
+          <p:nvPr>
+            <p:ph type="title"/>
+          </p:nvPr>
+        </p:nvSpPr>
+        <p:spPr>
+          <a:xfrm>
+            <a:off x="1945201" y="624110"/>
+            <a:ext cx="6589199" cy="788666"/>
+          </a:xfrm>
+        </p:spPr>
+        <p:txBody>
+          <a:bodyPr>
+            <a:normAutofit/>
+          </a:bodyPr>
+          <a:lstStyle/>
+          <a:p>
+            <a:r>
+              <a:rPr lang="fr-FR" dirty="0" smtClean="0"/>
+              <a:t>Contraintes</a:t>
+            </a:r>
+            <a:endParaRPr lang="fr-FR" dirty="0"/>
+          </a:p>
+        </p:txBody>
+      </p:sp>
+      <p:sp>
+        <p:nvSpPr>
+          <p:cNvPr id="3" name="Espace réservé du contenu 2"/>
+          <p:cNvSpPr>
+            <a:spLocks noGrp="1"/>
+          </p:cNvSpPr>
+          <p:nvPr>
+            <p:ph idx="1"/>
+          </p:nvPr>
+        </p:nvSpPr>
+        <p:spPr>
+          <a:xfrm>
+            <a:off x="1942415" y="1700808"/>
+            <a:ext cx="6591985" cy="2304256"/>
+          </a:xfrm>
+        </p:spPr>
+        <p:txBody>
+          <a:bodyPr>
+            <a:normAutofit/>
+          </a:bodyPr>
+          <a:lstStyle/>
+          <a:p>
+            <a:pPr lvl="1"/>
+            <a:r>
+              <a:rPr lang="fr-FR" dirty="0" smtClean="0"/>
+              <a:t>Temps </a:t>
+            </a:r>
+            <a:endParaRPr lang="fr-FR" dirty="0" smtClean="0"/>
+          </a:p>
+          <a:p>
+            <a:pPr lvl="2"/>
+            <a:r>
+              <a:rPr lang="fr-FR" dirty="0" smtClean="0"/>
+              <a:t>Durée pour faire le cycle complet du projet: 5 </a:t>
+            </a:r>
+            <a:r>
+              <a:rPr lang="fr-FR" dirty="0" smtClean="0"/>
+              <a:t>jours</a:t>
+            </a:r>
+            <a:endParaRPr lang="fr-FR" dirty="0" smtClean="0"/>
+          </a:p>
+          <a:p>
+            <a:pPr lvl="1"/>
+            <a:r>
+              <a:rPr lang="fr-FR" dirty="0" smtClean="0"/>
+              <a:t>Techniques :</a:t>
+            </a:r>
+          </a:p>
+          <a:p>
+            <a:pPr lvl="2"/>
+            <a:r>
+              <a:rPr lang="fr-FR" dirty="0" smtClean="0"/>
+              <a:t>Projet destiné à la Java Virtual </a:t>
+            </a:r>
+            <a:r>
+              <a:rPr lang="fr-FR" dirty="0" smtClean="0"/>
+              <a:t>Machine</a:t>
+            </a:r>
+            <a:endParaRPr lang="fr-FR" dirty="0" smtClean="0"/>
+          </a:p>
+          <a:p>
+            <a:pPr lvl="1"/>
+            <a:r>
+              <a:rPr lang="fr-FR" dirty="0" smtClean="0"/>
+              <a:t>Financières: </a:t>
+            </a:r>
+          </a:p>
+          <a:p>
+            <a:pPr lvl="2"/>
+            <a:r>
+              <a:rPr lang="fr-FR" dirty="0" smtClean="0"/>
+              <a:t>Projet non financé</a:t>
+            </a:r>
+            <a:endParaRPr lang="fr-FR" dirty="0"/>
+          </a:p>
+        </p:txBody>
+      </p:sp>
+      <p:sp>
+        <p:nvSpPr>
+          <p:cNvPr id="4" name="Espace réservé du contenu 2"/>
+          <p:cNvSpPr txBox="1">
+            <a:spLocks/>
+          </p:cNvSpPr>
+          <p:nvPr/>
+        </p:nvSpPr>
+        <p:spPr>
+          <a:xfrm>
+            <a:off x="4604751" y="4293096"/>
+            <a:ext cx="4287729" cy="2159496"/>
+          </a:xfrm>
+          <a:prstGeom prst="rect">
+            <a:avLst/>
+          </a:prstGeom>
+        </p:spPr>
+        <p:txBody>
+          <a:bodyPr vert="horz" lIns="91440" tIns="45720" rIns="91440" bIns="45720" rtlCol="0">
+            <a:normAutofit fontScale="92500" lnSpcReduction="10000"/>
+          </a:bodyPr>
+          <a:lstStyle>
+            <a:lvl1pPr marL="342900" indent="-342900" algn="l" defTabSz="457200" rtl="0" eaLnBrk="1" latinLnBrk="0" hangingPunct="1">
+              <a:spcBef>
+                <a:spcPts val="1000"/>
+              </a:spcBef>
+              <a:spcAft>
+                <a:spcPts val="0"/>
+              </a:spcAft>
+              <a:buClr>
+                <a:schemeClr val="accent1"/>
+              </a:buClr>
+              <a:buFont typeface="Wingdings 3" charset="2"/>
+              <a:buChar char=""/>
+              <a:defRPr sz="1800" kern="1200">
+                <a:solidFill>
+                  <a:schemeClr val="tx1">
+                    <a:lumMod val="75000"/>
+                    <a:lumOff val="25000"/>
+                  </a:schemeClr>
+                </a:solidFill>
+                <a:latin typeface="+mn-lt"/>
+                <a:ea typeface="+mn-ea"/>
+                <a:cs typeface="+mn-cs"/>
+              </a:defRPr>
+            </a:lvl1pPr>
+            <a:lvl2pPr marL="742950" indent="-285750" algn="l" defTabSz="457200" rtl="0" eaLnBrk="1" latinLnBrk="0" hangingPunct="1">
+              <a:spcBef>
+                <a:spcPts val="1000"/>
+              </a:spcBef>
+              <a:spcAft>
+                <a:spcPts val="0"/>
+              </a:spcAft>
+              <a:buClr>
+                <a:schemeClr val="accent1"/>
+              </a:buClr>
+              <a:buFont typeface="Wingdings 3" charset="2"/>
+              <a:buChar char=""/>
+              <a:defRPr sz="1600" kern="1200">
+                <a:solidFill>
+                  <a:schemeClr val="tx1">
+                    <a:lumMod val="75000"/>
+                    <a:lumOff val="25000"/>
+                  </a:schemeClr>
+                </a:solidFill>
+                <a:latin typeface="+mn-lt"/>
+                <a:ea typeface="+mn-ea"/>
+                <a:cs typeface="+mn-cs"/>
+              </a:defRPr>
+            </a:lvl2pPr>
+            <a:lvl3pPr marL="1143000" indent="-228600" algn="l" defTabSz="457200" rtl="0" eaLnBrk="1" latinLnBrk="0" hangingPunct="1">
+              <a:spcBef>
+                <a:spcPts val="1000"/>
+              </a:spcBef>
+              <a:spcAft>
+                <a:spcPts val="0"/>
+              </a:spcAft>
+              <a:buClr>
+                <a:schemeClr val="accent1"/>
+              </a:buClr>
+              <a:buFont typeface="Wingdings 3" charset="2"/>
+              <a:buChar char=""/>
+              <a:defRPr sz="1400" kern="1200">
+                <a:solidFill>
+                  <a:schemeClr val="tx1">
+                    <a:lumMod val="75000"/>
+                    <a:lumOff val="25000"/>
+                  </a:schemeClr>
+                </a:solidFill>
+                <a:latin typeface="+mn-lt"/>
+                <a:ea typeface="+mn-ea"/>
+                <a:cs typeface="+mn-cs"/>
+              </a:defRPr>
+            </a:lvl3pPr>
+            <a:lvl4pPr marL="1600200" indent="-228600" algn="l" defTabSz="457200" rtl="0" eaLnBrk="1" latinLnBrk="0" hangingPunct="1">
+              <a:spcBef>
+                <a:spcPts val="1000"/>
+              </a:spcBef>
+              <a:spcAft>
+                <a:spcPts val="0"/>
+              </a:spcAft>
+              <a:buClr>
+                <a:schemeClr val="accent1"/>
+              </a:buClr>
+              <a:buFont typeface="Wingdings 3" charset="2"/>
+              <a:buChar char=""/>
+              <a:defRPr sz="1200" kern="1200">
+                <a:solidFill>
+                  <a:schemeClr val="tx1">
+                    <a:lumMod val="75000"/>
+                    <a:lumOff val="25000"/>
+                  </a:schemeClr>
+                </a:solidFill>
+                <a:latin typeface="+mn-lt"/>
+                <a:ea typeface="+mn-ea"/>
+                <a:cs typeface="+mn-cs"/>
+              </a:defRPr>
+            </a:lvl4pPr>
+            <a:lvl5pPr marL="2057400" indent="-228600" algn="l" defTabSz="457200" rtl="0" eaLnBrk="1" latinLnBrk="0" hangingPunct="1">
+              <a:spcBef>
+                <a:spcPts val="1000"/>
+              </a:spcBef>
+              <a:spcAft>
+                <a:spcPts val="0"/>
+              </a:spcAft>
+              <a:buClr>
+                <a:schemeClr val="accent1"/>
+              </a:buClr>
+              <a:buFont typeface="Wingdings 3" charset="2"/>
+              <a:buChar char=""/>
+              <a:defRPr sz="1200" kern="1200">
+                <a:solidFill>
+                  <a:schemeClr val="tx1">
+                    <a:lumMod val="75000"/>
+                    <a:lumOff val="25000"/>
+                  </a:schemeClr>
+                </a:solidFill>
+                <a:latin typeface="+mn-lt"/>
+                <a:ea typeface="+mn-ea"/>
+                <a:cs typeface="+mn-cs"/>
+              </a:defRPr>
+            </a:lvl5pPr>
+            <a:lvl6pPr marL="2514600" indent="-228600" algn="l" defTabSz="457200" rtl="0" eaLnBrk="1" latinLnBrk="0" hangingPunct="1">
+              <a:spcBef>
+                <a:spcPts val="1000"/>
+              </a:spcBef>
+              <a:spcAft>
+                <a:spcPts val="0"/>
+              </a:spcAft>
+              <a:buClr>
+                <a:schemeClr val="accent1"/>
+              </a:buClr>
+              <a:buFont typeface="Wingdings 3" charset="2"/>
+              <a:buChar char=""/>
+              <a:defRPr sz="1200" kern="1200">
+                <a:solidFill>
+                  <a:schemeClr val="tx1">
+                    <a:lumMod val="75000"/>
+                    <a:lumOff val="25000"/>
+                  </a:schemeClr>
+                </a:solidFill>
+                <a:latin typeface="+mn-lt"/>
+                <a:ea typeface="+mn-ea"/>
+                <a:cs typeface="+mn-cs"/>
+              </a:defRPr>
+            </a:lvl6pPr>
+            <a:lvl7pPr marL="2971800" indent="-228600" algn="l" defTabSz="457200" rtl="0" eaLnBrk="1" latinLnBrk="0" hangingPunct="1">
+              <a:spcBef>
+                <a:spcPts val="1000"/>
+              </a:spcBef>
+              <a:spcAft>
+                <a:spcPts val="0"/>
+              </a:spcAft>
+              <a:buClr>
+                <a:schemeClr val="accent1"/>
+              </a:buClr>
+              <a:buFont typeface="Wingdings 3" charset="2"/>
+              <a:buChar char=""/>
+              <a:defRPr sz="1200" kern="1200">
+                <a:solidFill>
+                  <a:schemeClr val="tx1">
+                    <a:lumMod val="75000"/>
+                    <a:lumOff val="25000"/>
+                  </a:schemeClr>
+                </a:solidFill>
+                <a:latin typeface="+mn-lt"/>
+                <a:ea typeface="+mn-ea"/>
+                <a:cs typeface="+mn-cs"/>
+              </a:defRPr>
+            </a:lvl7pPr>
+            <a:lvl8pPr marL="3429000" indent="-228600" algn="l" defTabSz="457200" rtl="0" eaLnBrk="1" latinLnBrk="0" hangingPunct="1">
+              <a:spcBef>
+                <a:spcPts val="1000"/>
+              </a:spcBef>
+              <a:spcAft>
+                <a:spcPts val="0"/>
+              </a:spcAft>
+              <a:buClr>
+                <a:schemeClr val="accent1"/>
+              </a:buClr>
+              <a:buFont typeface="Wingdings 3" charset="2"/>
+              <a:buChar char=""/>
+              <a:defRPr sz="1200" kern="1200">
+                <a:solidFill>
+                  <a:schemeClr val="tx1">
+                    <a:lumMod val="75000"/>
+                    <a:lumOff val="25000"/>
+                  </a:schemeClr>
+                </a:solidFill>
+                <a:latin typeface="+mn-lt"/>
+                <a:ea typeface="+mn-ea"/>
+                <a:cs typeface="+mn-cs"/>
+              </a:defRPr>
+            </a:lvl8pPr>
+            <a:lvl9pPr marL="3886200" indent="-228600" algn="l" defTabSz="457200" rtl="0" eaLnBrk="1" latinLnBrk="0" hangingPunct="1">
+              <a:spcBef>
+                <a:spcPts val="1000"/>
+              </a:spcBef>
+              <a:spcAft>
+                <a:spcPts val="0"/>
+              </a:spcAft>
+              <a:buClr>
+                <a:schemeClr val="accent1"/>
+              </a:buClr>
+              <a:buFont typeface="Wingdings 3" charset="2"/>
+              <a:buChar char=""/>
+              <a:defRPr sz="1200" kern="1200">
+                <a:solidFill>
+                  <a:schemeClr val="tx1">
+                    <a:lumMod val="75000"/>
+                    <a:lumOff val="25000"/>
+                  </a:schemeClr>
+                </a:solidFill>
+                <a:latin typeface="+mn-lt"/>
+                <a:ea typeface="+mn-ea"/>
+                <a:cs typeface="+mn-cs"/>
+              </a:defRPr>
+            </a:lvl9pPr>
+          </a:lstStyle>
+          <a:p>
+            <a:pPr marL="0" indent="0">
+              <a:buNone/>
+            </a:pPr>
+            <a:r>
+              <a:rPr lang="fr-FR" i="1" dirty="0" smtClean="0">
+                <a:solidFill>
+                  <a:srgbClr val="0070C0"/>
+                </a:solidFill>
+              </a:rPr>
+              <a:t>Choix des outils en conséquence:</a:t>
+            </a:r>
+          </a:p>
+          <a:p>
+            <a:r>
+              <a:rPr lang="fr-FR" dirty="0" smtClean="0"/>
+              <a:t>UML avec </a:t>
+            </a:r>
+            <a:r>
+              <a:rPr lang="fr-FR" dirty="0" err="1" smtClean="0"/>
+              <a:t>Astah</a:t>
+            </a:r>
+            <a:endParaRPr lang="fr-FR" dirty="0" smtClean="0"/>
+          </a:p>
+          <a:p>
+            <a:r>
+              <a:rPr lang="fr-FR" dirty="0" smtClean="0"/>
+              <a:t>IDE Eclipse </a:t>
+            </a:r>
+            <a:r>
+              <a:rPr lang="fr-FR" dirty="0" err="1" smtClean="0"/>
+              <a:t>Oxygen</a:t>
+            </a:r>
+            <a:endParaRPr lang="fr-FR" dirty="0" smtClean="0"/>
+          </a:p>
+          <a:p>
+            <a:r>
+              <a:rPr lang="fr-FR" dirty="0" smtClean="0"/>
+              <a:t>Serveur local </a:t>
+            </a:r>
+            <a:r>
+              <a:rPr lang="fr-FR" dirty="0" err="1" smtClean="0"/>
+              <a:t>Tomcat</a:t>
+            </a:r>
+            <a:r>
+              <a:rPr lang="fr-FR" dirty="0" smtClean="0"/>
+              <a:t> 8.5</a:t>
+            </a:r>
+          </a:p>
+          <a:p>
+            <a:r>
+              <a:rPr lang="fr-FR" dirty="0" err="1" smtClean="0"/>
+              <a:t>Git’s</a:t>
+            </a:r>
+            <a:r>
+              <a:rPr lang="fr-FR" dirty="0" smtClean="0"/>
+              <a:t> </a:t>
+            </a:r>
+            <a:r>
+              <a:rPr lang="fr-FR" dirty="0" err="1" smtClean="0"/>
+              <a:t>remote</a:t>
+            </a:r>
+            <a:r>
+              <a:rPr lang="fr-FR" dirty="0" smtClean="0"/>
+              <a:t> </a:t>
+            </a:r>
+            <a:r>
+              <a:rPr lang="fr-FR" dirty="0" err="1" smtClean="0"/>
+              <a:t>repository</a:t>
+            </a:r>
+            <a:r>
+              <a:rPr lang="fr-FR" dirty="0" smtClean="0"/>
+              <a:t> avec GitHub</a:t>
+            </a:r>
+          </a:p>
+          <a:p>
+            <a:r>
+              <a:rPr lang="fr-FR" dirty="0" err="1" smtClean="0"/>
+              <a:t>Backlog</a:t>
+            </a:r>
+            <a:r>
+              <a:rPr lang="fr-FR" dirty="0" smtClean="0"/>
+              <a:t> à post-it au lieu d’utiliser </a:t>
+            </a:r>
+            <a:r>
+              <a:rPr lang="fr-FR" dirty="0" err="1" smtClean="0"/>
+              <a:t>Jira</a:t>
+            </a:r>
+            <a:endParaRPr lang="fr-FR" dirty="0" smtClean="0"/>
+          </a:p>
+          <a:p>
+            <a:pPr marL="914400" lvl="2" indent="0">
+              <a:buFont typeface="Wingdings 3" charset="2"/>
+              <a:buNone/>
+            </a:pPr>
+            <a:endParaRPr lang="fr-FR" dirty="0" smtClean="0"/>
+          </a:p>
+        </p:txBody>
+      </p:sp>
+    </p:spTree>
+    <p:extLst>
+      <p:ext uri="{BB962C8B-B14F-4D97-AF65-F5344CB8AC3E}">
+        <p14:creationId xmlns:p14="http://schemas.microsoft.com/office/powerpoint/2010/main" val="3776268605"/>
+      </p:ext>
+    </p:extLst>
+  </p:cSld>
+  <p:clrMapOvr>
+    <a:masterClrMapping/>
+  </p:clrMapOvr>
+  <p:timing>
+    <p:tnLst>
+      <p:par>
+        <p:cTn id="1" dur="indefinite" restart="never" nodeType="tmRoot"/>
+      </p:par>
+    </p:tnLst>
+  </p:timing>
+</p:sld>
+</file>
+
+<file path=ppt/slides/slide8.xml><?xml version="1.0" encoding="utf-8"?>
+<p:sld xmlns:a="http://schemas.openxmlformats.org/drawingml/2006/main" xmlns:r="http://schemas.openxmlformats.org/officeDocument/2006/relationships" xmlns:p="http://schemas.openxmlformats.org/presentationml/2006/main">
+  <p:cSld>
+    <p:spTree>
+      <p:nvGrpSpPr>
+        <p:cNvPr id="1" name=""/>
+        <p:cNvGrpSpPr/>
+        <p:nvPr/>
+      </p:nvGrpSpPr>
+      <p:grpSpPr>
+        <a:xfrm>
+          <a:off x="0" y="0"/>
+          <a:ext cx="0" cy="0"/>
+          <a:chOff x="0" y="0"/>
+          <a:chExt cx="0" cy="0"/>
+        </a:xfrm>
+      </p:grpSpPr>
+      <p:sp>
+        <p:nvSpPr>
+          <p:cNvPr id="2" name="Titre 1"/>
+          <p:cNvSpPr>
+            <a:spLocks noGrp="1"/>
+          </p:cNvSpPr>
+          <p:nvPr>
+            <p:ph type="title"/>
+          </p:nvPr>
+        </p:nvSpPr>
+        <p:spPr>
+          <a:xfrm>
+            <a:off x="1945201" y="624110"/>
+            <a:ext cx="6589199" cy="788666"/>
+          </a:xfrm>
+        </p:spPr>
+        <p:txBody>
+          <a:bodyPr/>
+          <a:lstStyle/>
+          <a:p>
+            <a:r>
+              <a:rPr lang="fr-FR" dirty="0"/>
+              <a:t>Solution technique</a:t>
+            </a:r>
+          </a:p>
+        </p:txBody>
+      </p:sp>
+      <p:sp>
+        <p:nvSpPr>
+          <p:cNvPr id="5" name="Espace réservé du contenu 2"/>
+          <p:cNvSpPr txBox="1">
+            <a:spLocks/>
+          </p:cNvSpPr>
+          <p:nvPr/>
+        </p:nvSpPr>
+        <p:spPr>
+          <a:xfrm>
+            <a:off x="1940455" y="1484784"/>
+            <a:ext cx="6591985" cy="2808312"/>
+          </a:xfrm>
+          <a:prstGeom prst="rect">
+            <a:avLst/>
+          </a:prstGeom>
+        </p:spPr>
+        <p:txBody>
+          <a:bodyPr vert="horz" lIns="91440" tIns="45720" rIns="91440" bIns="45720" rtlCol="0">
+            <a:normAutofit/>
+          </a:bodyPr>
+          <a:lstStyle>
+            <a:lvl1pPr marL="342900" indent="-342900" algn="l" defTabSz="457200" rtl="0" eaLnBrk="1" latinLnBrk="0" hangingPunct="1">
+              <a:spcBef>
+                <a:spcPts val="1000"/>
+              </a:spcBef>
+              <a:spcAft>
+                <a:spcPts val="0"/>
+              </a:spcAft>
+              <a:buClr>
+                <a:schemeClr val="accent1"/>
+              </a:buClr>
+              <a:buFont typeface="Wingdings 3" charset="2"/>
+              <a:buChar char=""/>
+              <a:defRPr sz="1800" kern="1200">
+                <a:solidFill>
+                  <a:schemeClr val="tx1">
+                    <a:lumMod val="75000"/>
+                    <a:lumOff val="25000"/>
+                  </a:schemeClr>
+                </a:solidFill>
+                <a:latin typeface="+mn-lt"/>
+                <a:ea typeface="+mn-ea"/>
+                <a:cs typeface="+mn-cs"/>
+              </a:defRPr>
+            </a:lvl1pPr>
+            <a:lvl2pPr marL="742950" indent="-285750" algn="l" defTabSz="457200" rtl="0" eaLnBrk="1" latinLnBrk="0" hangingPunct="1">
+              <a:spcBef>
+                <a:spcPts val="1000"/>
+              </a:spcBef>
+              <a:spcAft>
+                <a:spcPts val="0"/>
+              </a:spcAft>
+              <a:buClr>
+                <a:schemeClr val="accent1"/>
+              </a:buClr>
+              <a:buFont typeface="Wingdings 3" charset="2"/>
+              <a:buChar char=""/>
+              <a:defRPr sz="1600" kern="1200">
+                <a:solidFill>
+                  <a:schemeClr val="tx1">
+                    <a:lumMod val="75000"/>
+                    <a:lumOff val="25000"/>
+                  </a:schemeClr>
+                </a:solidFill>
+                <a:latin typeface="+mn-lt"/>
+                <a:ea typeface="+mn-ea"/>
+                <a:cs typeface="+mn-cs"/>
+              </a:defRPr>
+            </a:lvl2pPr>
+            <a:lvl3pPr marL="1143000" indent="-228600" algn="l" defTabSz="457200" rtl="0" eaLnBrk="1" latinLnBrk="0" hangingPunct="1">
+              <a:spcBef>
+                <a:spcPts val="1000"/>
+              </a:spcBef>
+              <a:spcAft>
+                <a:spcPts val="0"/>
+              </a:spcAft>
+              <a:buClr>
+                <a:schemeClr val="accent1"/>
+              </a:buClr>
+              <a:buFont typeface="Wingdings 3" charset="2"/>
+              <a:buChar char=""/>
+              <a:defRPr sz="1400" kern="1200">
+                <a:solidFill>
+                  <a:schemeClr val="tx1">
+                    <a:lumMod val="75000"/>
+                    <a:lumOff val="25000"/>
+                  </a:schemeClr>
+                </a:solidFill>
+                <a:latin typeface="+mn-lt"/>
+                <a:ea typeface="+mn-ea"/>
+                <a:cs typeface="+mn-cs"/>
+              </a:defRPr>
+            </a:lvl3pPr>
+            <a:lvl4pPr marL="1600200" indent="-228600" algn="l" defTabSz="457200" rtl="0" eaLnBrk="1" latinLnBrk="0" hangingPunct="1">
+              <a:spcBef>
+                <a:spcPts val="1000"/>
+              </a:spcBef>
+              <a:spcAft>
+                <a:spcPts val="0"/>
+              </a:spcAft>
+              <a:buClr>
+                <a:schemeClr val="accent1"/>
+              </a:buClr>
+              <a:buFont typeface="Wingdings 3" charset="2"/>
+              <a:buChar char=""/>
+              <a:defRPr sz="1200" kern="1200">
+                <a:solidFill>
+                  <a:schemeClr val="tx1">
+                    <a:lumMod val="75000"/>
+                    <a:lumOff val="25000"/>
+                  </a:schemeClr>
+                </a:solidFill>
+                <a:latin typeface="+mn-lt"/>
+                <a:ea typeface="+mn-ea"/>
+                <a:cs typeface="+mn-cs"/>
+              </a:defRPr>
+            </a:lvl4pPr>
+            <a:lvl5pPr marL="2057400" indent="-228600" algn="l" defTabSz="457200" rtl="0" eaLnBrk="1" latinLnBrk="0" hangingPunct="1">
+              <a:spcBef>
+                <a:spcPts val="1000"/>
+              </a:spcBef>
+              <a:spcAft>
+                <a:spcPts val="0"/>
+              </a:spcAft>
+              <a:buClr>
+                <a:schemeClr val="accent1"/>
+              </a:buClr>
+              <a:buFont typeface="Wingdings 3" charset="2"/>
+              <a:buChar char=""/>
+              <a:defRPr sz="1200" kern="1200">
+                <a:solidFill>
+                  <a:schemeClr val="tx1">
+                    <a:lumMod val="75000"/>
+                    <a:lumOff val="25000"/>
+                  </a:schemeClr>
+                </a:solidFill>
+                <a:latin typeface="+mn-lt"/>
+                <a:ea typeface="+mn-ea"/>
+                <a:cs typeface="+mn-cs"/>
+              </a:defRPr>
+            </a:lvl5pPr>
+            <a:lvl6pPr marL="2514600" indent="-228600" algn="l" defTabSz="457200" rtl="0" eaLnBrk="1" latinLnBrk="0" hangingPunct="1">
+              <a:spcBef>
+                <a:spcPts val="1000"/>
+              </a:spcBef>
+              <a:spcAft>
+                <a:spcPts val="0"/>
+              </a:spcAft>
+              <a:buClr>
+                <a:schemeClr val="accent1"/>
+              </a:buClr>
+              <a:buFont typeface="Wingdings 3" charset="2"/>
+              <a:buChar char=""/>
+              <a:defRPr sz="1200" kern="1200">
+                <a:solidFill>
+                  <a:schemeClr val="tx1">
+                    <a:lumMod val="75000"/>
+                    <a:lumOff val="25000"/>
+                  </a:schemeClr>
+                </a:solidFill>
+                <a:latin typeface="+mn-lt"/>
+                <a:ea typeface="+mn-ea"/>
+                <a:cs typeface="+mn-cs"/>
+              </a:defRPr>
+            </a:lvl6pPr>
+            <a:lvl7pPr marL="2971800" indent="-228600" algn="l" defTabSz="457200" rtl="0" eaLnBrk="1" latinLnBrk="0" hangingPunct="1">
+              <a:spcBef>
+                <a:spcPts val="1000"/>
+              </a:spcBef>
+              <a:spcAft>
+                <a:spcPts val="0"/>
+              </a:spcAft>
+              <a:buClr>
+                <a:schemeClr val="accent1"/>
+              </a:buClr>
+              <a:buFont typeface="Wingdings 3" charset="2"/>
+              <a:buChar char=""/>
+              <a:defRPr sz="1200" kern="1200">
+                <a:solidFill>
+                  <a:schemeClr val="tx1">
+                    <a:lumMod val="75000"/>
+                    <a:lumOff val="25000"/>
+                  </a:schemeClr>
+                </a:solidFill>
+                <a:latin typeface="+mn-lt"/>
+                <a:ea typeface="+mn-ea"/>
+                <a:cs typeface="+mn-cs"/>
+              </a:defRPr>
+            </a:lvl7pPr>
+            <a:lvl8pPr marL="3429000" indent="-228600" algn="l" defTabSz="457200" rtl="0" eaLnBrk="1" latinLnBrk="0" hangingPunct="1">
+              <a:spcBef>
+                <a:spcPts val="1000"/>
+              </a:spcBef>
+              <a:spcAft>
+                <a:spcPts val="0"/>
+              </a:spcAft>
+              <a:buClr>
+                <a:schemeClr val="accent1"/>
+              </a:buClr>
+              <a:buFont typeface="Wingdings 3" charset="2"/>
+              <a:buChar char=""/>
+              <a:defRPr sz="1200" kern="1200">
+                <a:solidFill>
+                  <a:schemeClr val="tx1">
+                    <a:lumMod val="75000"/>
+                    <a:lumOff val="25000"/>
+                  </a:schemeClr>
+                </a:solidFill>
+                <a:latin typeface="+mn-lt"/>
+                <a:ea typeface="+mn-ea"/>
+                <a:cs typeface="+mn-cs"/>
+              </a:defRPr>
+            </a:lvl8pPr>
+            <a:lvl9pPr marL="3886200" indent="-228600" algn="l" defTabSz="457200" rtl="0" eaLnBrk="1" latinLnBrk="0" hangingPunct="1">
+              <a:spcBef>
+                <a:spcPts val="1000"/>
+              </a:spcBef>
+              <a:spcAft>
+                <a:spcPts val="0"/>
+              </a:spcAft>
+              <a:buClr>
+                <a:schemeClr val="accent1"/>
+              </a:buClr>
+              <a:buFont typeface="Wingdings 3" charset="2"/>
+              <a:buChar char=""/>
+              <a:defRPr sz="1200" kern="1200">
+                <a:solidFill>
+                  <a:schemeClr val="tx1">
+                    <a:lumMod val="75000"/>
+                    <a:lumOff val="25000"/>
+                  </a:schemeClr>
+                </a:solidFill>
+                <a:latin typeface="+mn-lt"/>
+                <a:ea typeface="+mn-ea"/>
+                <a:cs typeface="+mn-cs"/>
+              </a:defRPr>
+            </a:lvl9pPr>
+          </a:lstStyle>
+          <a:p>
+            <a:r>
+              <a:rPr lang="fr-FR" dirty="0" smtClean="0"/>
+              <a:t>Application </a:t>
+            </a:r>
+            <a:r>
+              <a:rPr lang="fr-FR" dirty="0" smtClean="0"/>
+              <a:t>« légère </a:t>
+            </a:r>
+            <a:r>
+              <a:rPr lang="fr-FR" dirty="0" smtClean="0"/>
+              <a:t>»</a:t>
+            </a:r>
+          </a:p>
+          <a:p>
+            <a:r>
+              <a:rPr lang="fr-FR" dirty="0" smtClean="0"/>
+              <a:t>Choix du </a:t>
+            </a:r>
+            <a:r>
+              <a:rPr lang="fr-FR" dirty="0" err="1" smtClean="0"/>
+              <a:t>framework</a:t>
+            </a:r>
+            <a:r>
+              <a:rPr lang="fr-FR" dirty="0" smtClean="0"/>
+              <a:t> </a:t>
+            </a:r>
+            <a:r>
+              <a:rPr lang="fr-FR" dirty="0" err="1" smtClean="0"/>
+              <a:t>Spring</a:t>
+            </a:r>
+            <a:r>
+              <a:rPr lang="fr-FR" dirty="0" smtClean="0"/>
+              <a:t> MVC</a:t>
+            </a:r>
+            <a:endParaRPr lang="fr-FR" dirty="0" smtClean="0"/>
+          </a:p>
+          <a:p>
+            <a:endParaRPr lang="fr-FR" dirty="0" smtClean="0"/>
+          </a:p>
+        </p:txBody>
+      </p:sp>
+      <p:pic>
+        <p:nvPicPr>
+          <p:cNvPr id="6" name="Image 5"/>
+          <p:cNvPicPr>
+            <a:picLocks noChangeAspect="1"/>
+          </p:cNvPicPr>
+          <p:nvPr/>
+        </p:nvPicPr>
+        <p:blipFill>
+          <a:blip r:embed="rId2">
+            <a:extLst>
+              <a:ext uri="{28A0092B-C50C-407E-A947-70E740481C1C}">
+                <a14:useLocalDpi xmlns:a14="http://schemas.microsoft.com/office/drawing/2010/main" val="0"/>
+              </a:ext>
+            </a:extLst>
+          </a:blip>
+          <a:stretch>
+            <a:fillRect/>
+          </a:stretch>
+        </p:blipFill>
+        <p:spPr>
+          <a:xfrm>
+            <a:off x="2339752" y="2348880"/>
+            <a:ext cx="4763244" cy="3572433"/>
+          </a:xfrm>
+          <a:prstGeom prst="rect">
+            <a:avLst/>
+          </a:prstGeom>
+          <a:ln>
+            <a:noFill/>
+          </a:ln>
+          <a:effectLst>
+            <a:outerShdw blurRad="190500" algn="tl" rotWithShape="0">
+              <a:srgbClr val="000000">
+                <a:alpha val="70000"/>
+              </a:srgbClr>
+            </a:outerShdw>
+          </a:effectLst>
+        </p:spPr>
+      </p:pic>
     </p:spTree>
     <p:extLst>
       <p:ext uri="{BB962C8B-B14F-4D97-AF65-F5344CB8AC3E}">
         <p14:creationId xmlns:p14="http://schemas.microsoft.com/office/powerpoint/2010/main" val="559619718"/>
+      </p:ext>
+    </p:extLst>
+  </p:cSld>
+  <p:clrMapOvr>
+    <a:masterClrMapping/>
+  </p:clrMapOvr>
+  <p:timing>
+    <p:tnLst>
+      <p:par>
+        <p:cTn id="1" dur="indefinite" restart="never" nodeType="tmRoot"/>
+      </p:par>
+    </p:tnLst>
+  </p:timing>
+</p:sld>
+</file>
+
+<file path=ppt/slides/slide9.xml><?xml version="1.0" encoding="utf-8"?>
+<p:sld xmlns:a="http://schemas.openxmlformats.org/drawingml/2006/main" xmlns:r="http://schemas.openxmlformats.org/officeDocument/2006/relationships" xmlns:p="http://schemas.openxmlformats.org/presentationml/2006/main">
+  <p:cSld>
+    <p:spTree>
+      <p:nvGrpSpPr>
+        <p:cNvPr id="1" name=""/>
+        <p:cNvGrpSpPr/>
+        <p:nvPr/>
+      </p:nvGrpSpPr>
+      <p:grpSpPr>
+        <a:xfrm>
+          <a:off x="0" y="0"/>
+          <a:ext cx="0" cy="0"/>
+          <a:chOff x="0" y="0"/>
+          <a:chExt cx="0" cy="0"/>
+        </a:xfrm>
+      </p:grpSpPr>
+      <p:sp>
+        <p:nvSpPr>
+          <p:cNvPr id="2" name="Titre 1"/>
+          <p:cNvSpPr>
+            <a:spLocks noGrp="1"/>
+          </p:cNvSpPr>
+          <p:nvPr>
+            <p:ph type="title"/>
+          </p:nvPr>
+        </p:nvSpPr>
+        <p:spPr>
+          <a:xfrm>
+            <a:off x="1945201" y="624110"/>
+            <a:ext cx="6589199" cy="788666"/>
+          </a:xfrm>
+        </p:spPr>
+        <p:txBody>
+          <a:bodyPr/>
+          <a:lstStyle/>
+          <a:p>
+            <a:r>
+              <a:rPr lang="fr-FR" dirty="0" smtClean="0"/>
+              <a:t>Conception et modélisation</a:t>
+            </a:r>
+            <a:endParaRPr lang="fr-FR" dirty="0"/>
+          </a:p>
+        </p:txBody>
+      </p:sp>
+      <p:sp>
+        <p:nvSpPr>
+          <p:cNvPr id="5" name="Espace réservé du contenu 2"/>
+          <p:cNvSpPr txBox="1">
+            <a:spLocks/>
+          </p:cNvSpPr>
+          <p:nvPr/>
+        </p:nvSpPr>
+        <p:spPr>
+          <a:xfrm>
+            <a:off x="1940455" y="1484784"/>
+            <a:ext cx="6591985" cy="504056"/>
+          </a:xfrm>
+          <a:prstGeom prst="rect">
+            <a:avLst/>
+          </a:prstGeom>
+        </p:spPr>
+        <p:txBody>
+          <a:bodyPr vert="horz" lIns="91440" tIns="45720" rIns="91440" bIns="45720" rtlCol="0">
+            <a:normAutofit/>
+          </a:bodyPr>
+          <a:lstStyle>
+            <a:lvl1pPr marL="342900" indent="-342900" algn="l" defTabSz="457200" rtl="0" eaLnBrk="1" latinLnBrk="0" hangingPunct="1">
+              <a:spcBef>
+                <a:spcPts val="1000"/>
+              </a:spcBef>
+              <a:spcAft>
+                <a:spcPts val="0"/>
+              </a:spcAft>
+              <a:buClr>
+                <a:schemeClr val="accent1"/>
+              </a:buClr>
+              <a:buFont typeface="Wingdings 3" charset="2"/>
+              <a:buChar char=""/>
+              <a:defRPr sz="1800" kern="1200">
+                <a:solidFill>
+                  <a:schemeClr val="tx1">
+                    <a:lumMod val="75000"/>
+                    <a:lumOff val="25000"/>
+                  </a:schemeClr>
+                </a:solidFill>
+                <a:latin typeface="+mn-lt"/>
+                <a:ea typeface="+mn-ea"/>
+                <a:cs typeface="+mn-cs"/>
+              </a:defRPr>
+            </a:lvl1pPr>
+            <a:lvl2pPr marL="742950" indent="-285750" algn="l" defTabSz="457200" rtl="0" eaLnBrk="1" latinLnBrk="0" hangingPunct="1">
+              <a:spcBef>
+                <a:spcPts val="1000"/>
+              </a:spcBef>
+              <a:spcAft>
+                <a:spcPts val="0"/>
+              </a:spcAft>
+              <a:buClr>
+                <a:schemeClr val="accent1"/>
+              </a:buClr>
+              <a:buFont typeface="Wingdings 3" charset="2"/>
+              <a:buChar char=""/>
+              <a:defRPr sz="1600" kern="1200">
+                <a:solidFill>
+                  <a:schemeClr val="tx1">
+                    <a:lumMod val="75000"/>
+                    <a:lumOff val="25000"/>
+                  </a:schemeClr>
+                </a:solidFill>
+                <a:latin typeface="+mn-lt"/>
+                <a:ea typeface="+mn-ea"/>
+                <a:cs typeface="+mn-cs"/>
+              </a:defRPr>
+            </a:lvl2pPr>
+            <a:lvl3pPr marL="1143000" indent="-228600" algn="l" defTabSz="457200" rtl="0" eaLnBrk="1" latinLnBrk="0" hangingPunct="1">
+              <a:spcBef>
+                <a:spcPts val="1000"/>
+              </a:spcBef>
+              <a:spcAft>
+                <a:spcPts val="0"/>
+              </a:spcAft>
+              <a:buClr>
+                <a:schemeClr val="accent1"/>
+              </a:buClr>
+              <a:buFont typeface="Wingdings 3" charset="2"/>
+              <a:buChar char=""/>
+              <a:defRPr sz="1400" kern="1200">
+                <a:solidFill>
+                  <a:schemeClr val="tx1">
+                    <a:lumMod val="75000"/>
+                    <a:lumOff val="25000"/>
+                  </a:schemeClr>
+                </a:solidFill>
+                <a:latin typeface="+mn-lt"/>
+                <a:ea typeface="+mn-ea"/>
+                <a:cs typeface="+mn-cs"/>
+              </a:defRPr>
+            </a:lvl3pPr>
+            <a:lvl4pPr marL="1600200" indent="-228600" algn="l" defTabSz="457200" rtl="0" eaLnBrk="1" latinLnBrk="0" hangingPunct="1">
+              <a:spcBef>
+                <a:spcPts val="1000"/>
+              </a:spcBef>
+              <a:spcAft>
+                <a:spcPts val="0"/>
+              </a:spcAft>
+              <a:buClr>
+                <a:schemeClr val="accent1"/>
+              </a:buClr>
+              <a:buFont typeface="Wingdings 3" charset="2"/>
+              <a:buChar char=""/>
+              <a:defRPr sz="1200" kern="1200">
+                <a:solidFill>
+                  <a:schemeClr val="tx1">
+                    <a:lumMod val="75000"/>
+                    <a:lumOff val="25000"/>
+                  </a:schemeClr>
+                </a:solidFill>
+                <a:latin typeface="+mn-lt"/>
+                <a:ea typeface="+mn-ea"/>
+                <a:cs typeface="+mn-cs"/>
+              </a:defRPr>
+            </a:lvl4pPr>
+            <a:lvl5pPr marL="2057400" indent="-228600" algn="l" defTabSz="457200" rtl="0" eaLnBrk="1" latinLnBrk="0" hangingPunct="1">
+              <a:spcBef>
+                <a:spcPts val="1000"/>
+              </a:spcBef>
+              <a:spcAft>
+                <a:spcPts val="0"/>
+              </a:spcAft>
+              <a:buClr>
+                <a:schemeClr val="accent1"/>
+              </a:buClr>
+              <a:buFont typeface="Wingdings 3" charset="2"/>
+              <a:buChar char=""/>
+              <a:defRPr sz="1200" kern="1200">
+                <a:solidFill>
+                  <a:schemeClr val="tx1">
+                    <a:lumMod val="75000"/>
+                    <a:lumOff val="25000"/>
+                  </a:schemeClr>
+                </a:solidFill>
+                <a:latin typeface="+mn-lt"/>
+                <a:ea typeface="+mn-ea"/>
+                <a:cs typeface="+mn-cs"/>
+              </a:defRPr>
+            </a:lvl5pPr>
+            <a:lvl6pPr marL="2514600" indent="-228600" algn="l" defTabSz="457200" rtl="0" eaLnBrk="1" latinLnBrk="0" hangingPunct="1">
+              <a:spcBef>
+                <a:spcPts val="1000"/>
+              </a:spcBef>
+              <a:spcAft>
+                <a:spcPts val="0"/>
+              </a:spcAft>
+              <a:buClr>
+                <a:schemeClr val="accent1"/>
+              </a:buClr>
+              <a:buFont typeface="Wingdings 3" charset="2"/>
+              <a:buChar char=""/>
+              <a:defRPr sz="1200" kern="1200">
+                <a:solidFill>
+                  <a:schemeClr val="tx1">
+                    <a:lumMod val="75000"/>
+                    <a:lumOff val="25000"/>
+                  </a:schemeClr>
+                </a:solidFill>
+                <a:latin typeface="+mn-lt"/>
+                <a:ea typeface="+mn-ea"/>
+                <a:cs typeface="+mn-cs"/>
+              </a:defRPr>
+            </a:lvl6pPr>
+            <a:lvl7pPr marL="2971800" indent="-228600" algn="l" defTabSz="457200" rtl="0" eaLnBrk="1" latinLnBrk="0" hangingPunct="1">
+              <a:spcBef>
+                <a:spcPts val="1000"/>
+              </a:spcBef>
+              <a:spcAft>
+                <a:spcPts val="0"/>
+              </a:spcAft>
+              <a:buClr>
+                <a:schemeClr val="accent1"/>
+              </a:buClr>
+              <a:buFont typeface="Wingdings 3" charset="2"/>
+              <a:buChar char=""/>
+              <a:defRPr sz="1200" kern="1200">
+                <a:solidFill>
+                  <a:schemeClr val="tx1">
+                    <a:lumMod val="75000"/>
+                    <a:lumOff val="25000"/>
+                  </a:schemeClr>
+                </a:solidFill>
+                <a:latin typeface="+mn-lt"/>
+                <a:ea typeface="+mn-ea"/>
+                <a:cs typeface="+mn-cs"/>
+              </a:defRPr>
+            </a:lvl7pPr>
+            <a:lvl8pPr marL="3429000" indent="-228600" algn="l" defTabSz="457200" rtl="0" eaLnBrk="1" latinLnBrk="0" hangingPunct="1">
+              <a:spcBef>
+                <a:spcPts val="1000"/>
+              </a:spcBef>
+              <a:spcAft>
+                <a:spcPts val="0"/>
+              </a:spcAft>
+              <a:buClr>
+                <a:schemeClr val="accent1"/>
+              </a:buClr>
+              <a:buFont typeface="Wingdings 3" charset="2"/>
+              <a:buChar char=""/>
+              <a:defRPr sz="1200" kern="1200">
+                <a:solidFill>
+                  <a:schemeClr val="tx1">
+                    <a:lumMod val="75000"/>
+                    <a:lumOff val="25000"/>
+                  </a:schemeClr>
+                </a:solidFill>
+                <a:latin typeface="+mn-lt"/>
+                <a:ea typeface="+mn-ea"/>
+                <a:cs typeface="+mn-cs"/>
+              </a:defRPr>
+            </a:lvl8pPr>
+            <a:lvl9pPr marL="3886200" indent="-228600" algn="l" defTabSz="457200" rtl="0" eaLnBrk="1" latinLnBrk="0" hangingPunct="1">
+              <a:spcBef>
+                <a:spcPts val="1000"/>
+              </a:spcBef>
+              <a:spcAft>
+                <a:spcPts val="0"/>
+              </a:spcAft>
+              <a:buClr>
+                <a:schemeClr val="accent1"/>
+              </a:buClr>
+              <a:buFont typeface="Wingdings 3" charset="2"/>
+              <a:buChar char=""/>
+              <a:defRPr sz="1200" kern="1200">
+                <a:solidFill>
+                  <a:schemeClr val="tx1">
+                    <a:lumMod val="75000"/>
+                    <a:lumOff val="25000"/>
+                  </a:schemeClr>
+                </a:solidFill>
+                <a:latin typeface="+mn-lt"/>
+                <a:ea typeface="+mn-ea"/>
+                <a:cs typeface="+mn-cs"/>
+              </a:defRPr>
+            </a:lvl9pPr>
+          </a:lstStyle>
+          <a:p>
+            <a:r>
+              <a:rPr lang="fr-FR" dirty="0" smtClean="0"/>
+              <a:t>Conception</a:t>
+            </a:r>
+          </a:p>
+          <a:p>
+            <a:endParaRPr lang="fr-FR" dirty="0" smtClean="0"/>
+          </a:p>
+        </p:txBody>
+      </p:sp>
+      <p:grpSp>
+        <p:nvGrpSpPr>
+          <p:cNvPr id="3" name="Groupe 2"/>
+          <p:cNvGrpSpPr/>
+          <p:nvPr/>
+        </p:nvGrpSpPr>
+        <p:grpSpPr>
+          <a:xfrm>
+            <a:off x="971600" y="2479067"/>
+            <a:ext cx="4773734" cy="3902261"/>
+            <a:chOff x="971600" y="1916832"/>
+            <a:chExt cx="5830804" cy="4766357"/>
+          </a:xfrm>
+        </p:grpSpPr>
+        <p:pic>
+          <p:nvPicPr>
+            <p:cNvPr id="6" name="Image 5"/>
+            <p:cNvPicPr>
+              <a:picLocks noChangeAspect="1"/>
+            </p:cNvPicPr>
+            <p:nvPr/>
+          </p:nvPicPr>
+          <p:blipFill>
+            <a:blip r:embed="rId2">
+              <a:extLst>
+                <a:ext uri="{28A0092B-C50C-407E-A947-70E740481C1C}">
+                  <a14:useLocalDpi xmlns:a14="http://schemas.microsoft.com/office/drawing/2010/main" val="0"/>
+                </a:ext>
+              </a:extLst>
+            </a:blip>
+            <a:stretch>
+              <a:fillRect/>
+            </a:stretch>
+          </p:blipFill>
+          <p:spPr>
+            <a:xfrm>
+              <a:off x="971600" y="1916832"/>
+              <a:ext cx="5830804" cy="4766357"/>
+            </a:xfrm>
+            <a:prstGeom prst="rect">
+              <a:avLst/>
+            </a:prstGeom>
+            <a:ln>
+              <a:noFill/>
+            </a:ln>
+            <a:effectLst>
+              <a:outerShdw blurRad="190500" algn="tl" rotWithShape="0">
+                <a:srgbClr val="000000">
+                  <a:alpha val="70000"/>
+                </a:srgbClr>
+              </a:outerShdw>
+            </a:effectLst>
+          </p:spPr>
+        </p:pic>
+        <p:sp>
+          <p:nvSpPr>
+            <p:cNvPr id="7" name="ZoneTexte 6"/>
+            <p:cNvSpPr txBox="1"/>
+            <p:nvPr/>
+          </p:nvSpPr>
+          <p:spPr>
+            <a:xfrm>
+              <a:off x="2642708" y="4115659"/>
+              <a:ext cx="3095931" cy="563894"/>
+            </a:xfrm>
+            <a:prstGeom prst="rect">
+              <a:avLst/>
+            </a:prstGeom>
+            <a:noFill/>
+          </p:spPr>
+          <p:txBody>
+            <a:bodyPr wrap="none" rtlCol="0">
+              <a:spAutoFit/>
+            </a:bodyPr>
+            <a:lstStyle/>
+            <a:p>
+              <a:r>
+                <a:rPr lang="fr-FR" sz="1200" dirty="0" smtClean="0">
+                  <a:ln w="0"/>
+                  <a:gradFill>
+                    <a:gsLst>
+                      <a:gs pos="0">
+                        <a:schemeClr val="accent5">
+                          <a:lumMod val="50000"/>
+                        </a:schemeClr>
+                      </a:gs>
+                      <a:gs pos="50000">
+                        <a:schemeClr val="accent5"/>
+                      </a:gs>
+                      <a:gs pos="100000">
+                        <a:schemeClr val="accent5">
+                          <a:lumMod val="60000"/>
+                          <a:lumOff val="40000"/>
+                        </a:schemeClr>
+                      </a:gs>
+                    </a:gsLst>
+                    <a:lin ang="5400000"/>
+                  </a:gradFill>
+                  <a:effectLst>
+                    <a:reflection blurRad="6350" stA="53000" endA="300" endPos="35500" dir="5400000" sy="-90000" algn="bl" rotWithShape="0"/>
+                  </a:effectLst>
+                </a:rPr>
+                <a:t>Conception finale du modèle objet</a:t>
+              </a:r>
+            </a:p>
+            <a:p>
+              <a:r>
+                <a:rPr lang="fr-FR" sz="1200" dirty="0" smtClean="0">
+                  <a:ln w="0"/>
+                  <a:gradFill>
+                    <a:gsLst>
+                      <a:gs pos="0">
+                        <a:schemeClr val="accent5">
+                          <a:lumMod val="50000"/>
+                        </a:schemeClr>
+                      </a:gs>
+                      <a:gs pos="50000">
+                        <a:schemeClr val="accent5"/>
+                      </a:gs>
+                      <a:gs pos="100000">
+                        <a:schemeClr val="accent5">
+                          <a:lumMod val="60000"/>
+                          <a:lumOff val="40000"/>
+                        </a:schemeClr>
+                      </a:gs>
+                    </a:gsLst>
+                    <a:lin ang="5400000"/>
+                  </a:gradFill>
+                  <a:effectLst>
+                    <a:reflection blurRad="6350" stA="53000" endA="300" endPos="35500" dir="5400000" sy="-90000" algn="bl" rotWithShape="0"/>
+                  </a:effectLst>
+                </a:rPr>
+                <a:t>du projet</a:t>
+              </a:r>
+              <a:endParaRPr lang="fr-FR" sz="1200" dirty="0">
+                <a:ln w="0"/>
+                <a:gradFill>
+                  <a:gsLst>
+                    <a:gs pos="0">
+                      <a:schemeClr val="accent5">
+                        <a:lumMod val="50000"/>
+                      </a:schemeClr>
+                    </a:gs>
+                    <a:gs pos="50000">
+                      <a:schemeClr val="accent5"/>
+                    </a:gs>
+                    <a:gs pos="100000">
+                      <a:schemeClr val="accent5">
+                        <a:lumMod val="60000"/>
+                        <a:lumOff val="40000"/>
+                      </a:schemeClr>
+                    </a:gs>
+                  </a:gsLst>
+                  <a:lin ang="5400000"/>
+                </a:gradFill>
+                <a:effectLst>
+                  <a:reflection blurRad="6350" stA="53000" endA="300" endPos="35500" dir="5400000" sy="-90000" algn="bl" rotWithShape="0"/>
+                </a:effectLst>
+              </a:endParaRPr>
+            </a:p>
+          </p:txBody>
+        </p:sp>
+      </p:grpSp>
+      <p:pic>
+        <p:nvPicPr>
+          <p:cNvPr id="8" name="Image 7"/>
+          <p:cNvPicPr>
+            <a:picLocks noChangeAspect="1"/>
+          </p:cNvPicPr>
+          <p:nvPr/>
+        </p:nvPicPr>
+        <p:blipFill>
+          <a:blip r:embed="rId3"/>
+          <a:stretch>
+            <a:fillRect/>
+          </a:stretch>
+        </p:blipFill>
+        <p:spPr>
+          <a:xfrm>
+            <a:off x="6948264" y="3452824"/>
+            <a:ext cx="1695450" cy="2114550"/>
+          </a:xfrm>
+          <a:prstGeom prst="rect">
+            <a:avLst/>
+          </a:prstGeom>
+          <a:ln>
+            <a:noFill/>
+          </a:ln>
+          <a:effectLst>
+            <a:outerShdw blurRad="190500" algn="tl" rotWithShape="0">
+              <a:srgbClr val="000000">
+                <a:alpha val="70000"/>
+              </a:srgbClr>
+            </a:outerShdw>
+          </a:effectLst>
+        </p:spPr>
+      </p:pic>
+      <p:sp>
+        <p:nvSpPr>
+          <p:cNvPr id="9" name="Flèche droite 8"/>
+          <p:cNvSpPr/>
+          <p:nvPr/>
+        </p:nvSpPr>
+        <p:spPr>
+          <a:xfrm>
+            <a:off x="5868144" y="3934035"/>
+            <a:ext cx="1008112" cy="1152128"/>
+          </a:xfrm>
+          <a:prstGeom prst="rightArrow">
+            <a:avLst/>
+          </a:prstGeom>
+        </p:spPr>
+        <p:style>
+          <a:lnRef idx="1">
+            <a:schemeClr val="accent6"/>
+          </a:lnRef>
+          <a:fillRef idx="3">
+            <a:schemeClr val="accent6"/>
+          </a:fillRef>
+          <a:effectRef idx="2">
+            <a:schemeClr val="accent6"/>
+          </a:effectRef>
+          <a:fontRef idx="minor">
+            <a:schemeClr val="lt1"/>
+          </a:fontRef>
+        </p:style>
+        <p:txBody>
+          <a:bodyPr rtlCol="0" anchor="ctr"/>
+          <a:lstStyle/>
+          <a:p>
+            <a:pPr algn="ctr"/>
+            <a:endParaRPr lang="fr-FR"/>
+          </a:p>
+        </p:txBody>
+      </p:sp>
+    </p:spTree>
+    <p:extLst>
+      <p:ext uri="{BB962C8B-B14F-4D97-AF65-F5344CB8AC3E}">
+        <p14:creationId xmlns:p14="http://schemas.microsoft.com/office/powerpoint/2010/main" val="2256953653"/>
       </p:ext>
     </p:extLst>
   </p:cSld>

</xml_diff>